<commit_message>
23-01-06 3주 5일차 결산 upload
Mineamine data 수정
</commit_message>
<xml_diff>
--- a/final_project/프로젝트 필요 양식/멘토링_1조.pptx
+++ b/final_project/프로젝트 필요 양식/멘토링_1조.pptx
@@ -4,6 +4,9 @@
   <p:sldMasterIdLst>
     <p:sldMasterId id="2147483648" r:id="rId1"/>
   </p:sldMasterIdLst>
+  <p:notesMasterIdLst>
+    <p:notesMasterId r:id="rId11"/>
+  </p:notesMasterIdLst>
   <p:sldIdLst>
     <p:sldId id="256" r:id="rId2"/>
     <p:sldId id="265" r:id="rId3"/>
@@ -11,10 +14,9 @@
     <p:sldId id="264" r:id="rId5"/>
     <p:sldId id="266" r:id="rId6"/>
     <p:sldId id="267" r:id="rId7"/>
-    <p:sldId id="268" r:id="rId8"/>
-    <p:sldId id="269" r:id="rId9"/>
-    <p:sldId id="260" r:id="rId10"/>
-    <p:sldId id="261" r:id="rId11"/>
+    <p:sldId id="269" r:id="rId8"/>
+    <p:sldId id="260" r:id="rId9"/>
+    <p:sldId id="261" r:id="rId10"/>
   </p:sldIdLst>
   <p:sldSz cx="18288000" cy="10287000"/>
   <p:notesSz cx="10287000" cy="18288000"/>
@@ -132,6 +134,954 @@
 </p:presentation>
 </file>
 
+<file path=ppt/notesMasters/notesMaster1.xml><?xml version="1.0" encoding="utf-8"?>
+<p:notesMaster xmlns:a="http://schemas.openxmlformats.org/drawingml/2006/main" xmlns:r="http://schemas.openxmlformats.org/officeDocument/2006/relationships" xmlns:p="http://schemas.openxmlformats.org/presentationml/2006/main">
+  <p:cSld>
+    <p:bg>
+      <p:bgRef idx="1001">
+        <a:schemeClr val="bg1"/>
+      </p:bgRef>
+    </p:bg>
+    <p:spTree>
+      <p:nvGrpSpPr>
+        <p:cNvPr id="1" name=""/>
+        <p:cNvGrpSpPr/>
+        <p:nvPr/>
+      </p:nvGrpSpPr>
+      <p:grpSpPr>
+        <a:xfrm>
+          <a:off x="0" y="0"/>
+          <a:ext cx="0" cy="0"/>
+          <a:chOff x="0" y="0"/>
+          <a:chExt cx="0" cy="0"/>
+        </a:xfrm>
+      </p:grpSpPr>
+      <p:sp>
+        <p:nvSpPr>
+          <p:cNvPr id="2" name="머리글 개체 틀 1"/>
+          <p:cNvSpPr>
+            <a:spLocks noGrp="1"/>
+          </p:cNvSpPr>
+          <p:nvPr>
+            <p:ph type="hdr" sz="quarter"/>
+          </p:nvPr>
+        </p:nvSpPr>
+        <p:spPr>
+          <a:xfrm>
+            <a:off x="0" y="0"/>
+            <a:ext cx="4457700" cy="917575"/>
+          </a:xfrm>
+          <a:prstGeom prst="rect">
+            <a:avLst/>
+          </a:prstGeom>
+        </p:spPr>
+        <p:txBody>
+          <a:bodyPr vert="horz" lIns="91440" tIns="45720" rIns="91440" bIns="45720" rtlCol="0"/>
+          <a:lstStyle>
+            <a:lvl1pPr algn="l">
+              <a:defRPr sz="1200"/>
+            </a:lvl1pPr>
+          </a:lstStyle>
+          <a:p>
+            <a:endParaRPr lang="ko-KR" altLang="en-US"/>
+          </a:p>
+        </p:txBody>
+      </p:sp>
+      <p:sp>
+        <p:nvSpPr>
+          <p:cNvPr id="3" name="날짜 개체 틀 2"/>
+          <p:cNvSpPr>
+            <a:spLocks noGrp="1"/>
+          </p:cNvSpPr>
+          <p:nvPr>
+            <p:ph type="dt" idx="1"/>
+          </p:nvPr>
+        </p:nvSpPr>
+        <p:spPr>
+          <a:xfrm>
+            <a:off x="5827713" y="0"/>
+            <a:ext cx="4457700" cy="917575"/>
+          </a:xfrm>
+          <a:prstGeom prst="rect">
+            <a:avLst/>
+          </a:prstGeom>
+        </p:spPr>
+        <p:txBody>
+          <a:bodyPr vert="horz" lIns="91440" tIns="45720" rIns="91440" bIns="45720" rtlCol="0"/>
+          <a:lstStyle>
+            <a:lvl1pPr algn="r">
+              <a:defRPr sz="1200"/>
+            </a:lvl1pPr>
+          </a:lstStyle>
+          <a:p>
+            <a:fld id="{E09E3F4A-D54F-49F7-AF73-7DD91EFD19C5}" type="datetimeFigureOut">
+              <a:rPr lang="ko-KR" altLang="en-US" smtClean="0"/>
+              <a:t>2023-01-06</a:t>
+            </a:fld>
+            <a:endParaRPr lang="ko-KR" altLang="en-US"/>
+          </a:p>
+        </p:txBody>
+      </p:sp>
+      <p:sp>
+        <p:nvSpPr>
+          <p:cNvPr id="4" name="슬라이드 이미지 개체 틀 3"/>
+          <p:cNvSpPr>
+            <a:spLocks noGrp="1" noRot="1" noChangeAspect="1"/>
+          </p:cNvSpPr>
+          <p:nvPr>
+            <p:ph type="sldImg" idx="2"/>
+          </p:nvPr>
+        </p:nvSpPr>
+        <p:spPr>
+          <a:xfrm>
+            <a:off x="-342900" y="2286000"/>
+            <a:ext cx="10972800" cy="6172200"/>
+          </a:xfrm>
+          <a:prstGeom prst="rect">
+            <a:avLst/>
+          </a:prstGeom>
+          <a:noFill/>
+          <a:ln w="12700">
+            <a:solidFill>
+              <a:prstClr val="black"/>
+            </a:solidFill>
+          </a:ln>
+        </p:spPr>
+        <p:txBody>
+          <a:bodyPr vert="horz" lIns="91440" tIns="45720" rIns="91440" bIns="45720" rtlCol="0" anchor="ctr"/>
+          <a:lstStyle/>
+          <a:p>
+            <a:endParaRPr lang="ko-KR" altLang="en-US"/>
+          </a:p>
+        </p:txBody>
+      </p:sp>
+      <p:sp>
+        <p:nvSpPr>
+          <p:cNvPr id="5" name="슬라이드 노트 개체 틀 4"/>
+          <p:cNvSpPr>
+            <a:spLocks noGrp="1"/>
+          </p:cNvSpPr>
+          <p:nvPr>
+            <p:ph type="body" sz="quarter" idx="3"/>
+          </p:nvPr>
+        </p:nvSpPr>
+        <p:spPr>
+          <a:xfrm>
+            <a:off x="1028700" y="8801100"/>
+            <a:ext cx="8229600" cy="7200900"/>
+          </a:xfrm>
+          <a:prstGeom prst="rect">
+            <a:avLst/>
+          </a:prstGeom>
+        </p:spPr>
+        <p:txBody>
+          <a:bodyPr vert="horz" lIns="91440" tIns="45720" rIns="91440" bIns="45720" rtlCol="0"/>
+          <a:lstStyle/>
+          <a:p>
+            <a:pPr lvl="0"/>
+            <a:r>
+              <a:rPr lang="ko-KR" altLang="en-US"/>
+              <a:t>마스터 텍스트 스타일을 편집하려면 클릭</a:t>
+            </a:r>
+          </a:p>
+          <a:p>
+            <a:pPr lvl="1"/>
+            <a:r>
+              <a:rPr lang="ko-KR" altLang="en-US"/>
+              <a:t>두 번째 수준</a:t>
+            </a:r>
+          </a:p>
+          <a:p>
+            <a:pPr lvl="2"/>
+            <a:r>
+              <a:rPr lang="ko-KR" altLang="en-US"/>
+              <a:t>세 번째 수준</a:t>
+            </a:r>
+          </a:p>
+          <a:p>
+            <a:pPr lvl="3"/>
+            <a:r>
+              <a:rPr lang="ko-KR" altLang="en-US"/>
+              <a:t>네 번째 수준</a:t>
+            </a:r>
+          </a:p>
+          <a:p>
+            <a:pPr lvl="4"/>
+            <a:r>
+              <a:rPr lang="ko-KR" altLang="en-US"/>
+              <a:t>다섯 번째 수준</a:t>
+            </a:r>
+          </a:p>
+        </p:txBody>
+      </p:sp>
+      <p:sp>
+        <p:nvSpPr>
+          <p:cNvPr id="6" name="바닥글 개체 틀 5"/>
+          <p:cNvSpPr>
+            <a:spLocks noGrp="1"/>
+          </p:cNvSpPr>
+          <p:nvPr>
+            <p:ph type="ftr" sz="quarter" idx="4"/>
+          </p:nvPr>
+        </p:nvSpPr>
+        <p:spPr>
+          <a:xfrm>
+            <a:off x="0" y="17372013"/>
+            <a:ext cx="4457700" cy="915987"/>
+          </a:xfrm>
+          <a:prstGeom prst="rect">
+            <a:avLst/>
+          </a:prstGeom>
+        </p:spPr>
+        <p:txBody>
+          <a:bodyPr vert="horz" lIns="91440" tIns="45720" rIns="91440" bIns="45720" rtlCol="0" anchor="b"/>
+          <a:lstStyle>
+            <a:lvl1pPr algn="l">
+              <a:defRPr sz="1200"/>
+            </a:lvl1pPr>
+          </a:lstStyle>
+          <a:p>
+            <a:endParaRPr lang="ko-KR" altLang="en-US"/>
+          </a:p>
+        </p:txBody>
+      </p:sp>
+      <p:sp>
+        <p:nvSpPr>
+          <p:cNvPr id="7" name="슬라이드 번호 개체 틀 6"/>
+          <p:cNvSpPr>
+            <a:spLocks noGrp="1"/>
+          </p:cNvSpPr>
+          <p:nvPr>
+            <p:ph type="sldNum" sz="quarter" idx="5"/>
+          </p:nvPr>
+        </p:nvSpPr>
+        <p:spPr>
+          <a:xfrm>
+            <a:off x="5827713" y="17372013"/>
+            <a:ext cx="4457700" cy="915987"/>
+          </a:xfrm>
+          <a:prstGeom prst="rect">
+            <a:avLst/>
+          </a:prstGeom>
+        </p:spPr>
+        <p:txBody>
+          <a:bodyPr vert="horz" lIns="91440" tIns="45720" rIns="91440" bIns="45720" rtlCol="0" anchor="b"/>
+          <a:lstStyle>
+            <a:lvl1pPr algn="r">
+              <a:defRPr sz="1200"/>
+            </a:lvl1pPr>
+          </a:lstStyle>
+          <a:p>
+            <a:fld id="{643D7F1F-6367-4A19-98C0-611AC08B54C6}" type="slidenum">
+              <a:rPr lang="ko-KR" altLang="en-US" smtClean="0"/>
+              <a:t>‹#›</a:t>
+            </a:fld>
+            <a:endParaRPr lang="ko-KR" altLang="en-US"/>
+          </a:p>
+        </p:txBody>
+      </p:sp>
+    </p:spTree>
+    <p:extLst>
+      <p:ext uri="{BB962C8B-B14F-4D97-AF65-F5344CB8AC3E}">
+        <p14:creationId xmlns:p14="http://schemas.microsoft.com/office/powerpoint/2010/main" val="371185737"/>
+      </p:ext>
+    </p:extLst>
+  </p:cSld>
+  <p:clrMap bg1="lt1" tx1="dk1" bg2="lt2" tx2="dk2" accent1="accent1" accent2="accent2" accent3="accent3" accent4="accent4" accent5="accent5" accent6="accent6" hlink="hlink" folHlink="folHlink"/>
+  <p:notesStyle>
+    <a:lvl1pPr marL="0" algn="l" defTabSz="914400" rtl="0" eaLnBrk="1" latinLnBrk="1" hangingPunct="1">
+      <a:defRPr sz="1200" kern="1200">
+        <a:solidFill>
+          <a:schemeClr val="tx1"/>
+        </a:solidFill>
+        <a:latin typeface="+mn-lt"/>
+        <a:ea typeface="+mn-ea"/>
+        <a:cs typeface="+mn-cs"/>
+      </a:defRPr>
+    </a:lvl1pPr>
+    <a:lvl2pPr marL="457200" algn="l" defTabSz="914400" rtl="0" eaLnBrk="1" latinLnBrk="1" hangingPunct="1">
+      <a:defRPr sz="1200" kern="1200">
+        <a:solidFill>
+          <a:schemeClr val="tx1"/>
+        </a:solidFill>
+        <a:latin typeface="+mn-lt"/>
+        <a:ea typeface="+mn-ea"/>
+        <a:cs typeface="+mn-cs"/>
+      </a:defRPr>
+    </a:lvl2pPr>
+    <a:lvl3pPr marL="914400" algn="l" defTabSz="914400" rtl="0" eaLnBrk="1" latinLnBrk="1" hangingPunct="1">
+      <a:defRPr sz="1200" kern="1200">
+        <a:solidFill>
+          <a:schemeClr val="tx1"/>
+        </a:solidFill>
+        <a:latin typeface="+mn-lt"/>
+        <a:ea typeface="+mn-ea"/>
+        <a:cs typeface="+mn-cs"/>
+      </a:defRPr>
+    </a:lvl3pPr>
+    <a:lvl4pPr marL="1371600" algn="l" defTabSz="914400" rtl="0" eaLnBrk="1" latinLnBrk="1" hangingPunct="1">
+      <a:defRPr sz="1200" kern="1200">
+        <a:solidFill>
+          <a:schemeClr val="tx1"/>
+        </a:solidFill>
+        <a:latin typeface="+mn-lt"/>
+        <a:ea typeface="+mn-ea"/>
+        <a:cs typeface="+mn-cs"/>
+      </a:defRPr>
+    </a:lvl4pPr>
+    <a:lvl5pPr marL="1828800" algn="l" defTabSz="914400" rtl="0" eaLnBrk="1" latinLnBrk="1" hangingPunct="1">
+      <a:defRPr sz="1200" kern="1200">
+        <a:solidFill>
+          <a:schemeClr val="tx1"/>
+        </a:solidFill>
+        <a:latin typeface="+mn-lt"/>
+        <a:ea typeface="+mn-ea"/>
+        <a:cs typeface="+mn-cs"/>
+      </a:defRPr>
+    </a:lvl5pPr>
+    <a:lvl6pPr marL="2286000" algn="l" defTabSz="914400" rtl="0" eaLnBrk="1" latinLnBrk="1" hangingPunct="1">
+      <a:defRPr sz="1200" kern="1200">
+        <a:solidFill>
+          <a:schemeClr val="tx1"/>
+        </a:solidFill>
+        <a:latin typeface="+mn-lt"/>
+        <a:ea typeface="+mn-ea"/>
+        <a:cs typeface="+mn-cs"/>
+      </a:defRPr>
+    </a:lvl6pPr>
+    <a:lvl7pPr marL="2743200" algn="l" defTabSz="914400" rtl="0" eaLnBrk="1" latinLnBrk="1" hangingPunct="1">
+      <a:defRPr sz="1200" kern="1200">
+        <a:solidFill>
+          <a:schemeClr val="tx1"/>
+        </a:solidFill>
+        <a:latin typeface="+mn-lt"/>
+        <a:ea typeface="+mn-ea"/>
+        <a:cs typeface="+mn-cs"/>
+      </a:defRPr>
+    </a:lvl7pPr>
+    <a:lvl8pPr marL="3200400" algn="l" defTabSz="914400" rtl="0" eaLnBrk="1" latinLnBrk="1" hangingPunct="1">
+      <a:defRPr sz="1200" kern="1200">
+        <a:solidFill>
+          <a:schemeClr val="tx1"/>
+        </a:solidFill>
+        <a:latin typeface="+mn-lt"/>
+        <a:ea typeface="+mn-ea"/>
+        <a:cs typeface="+mn-cs"/>
+      </a:defRPr>
+    </a:lvl8pPr>
+    <a:lvl9pPr marL="3657600" algn="l" defTabSz="914400" rtl="0" eaLnBrk="1" latinLnBrk="1" hangingPunct="1">
+      <a:defRPr sz="1200" kern="1200">
+        <a:solidFill>
+          <a:schemeClr val="tx1"/>
+        </a:solidFill>
+        <a:latin typeface="+mn-lt"/>
+        <a:ea typeface="+mn-ea"/>
+        <a:cs typeface="+mn-cs"/>
+      </a:defRPr>
+    </a:lvl9pPr>
+  </p:notesStyle>
+</p:notesMaster>
+</file>
+
+<file path=ppt/notesSlides/notesSlide1.xml><?xml version="1.0" encoding="utf-8"?>
+<p:notes xmlns:a="http://schemas.openxmlformats.org/drawingml/2006/main" xmlns:r="http://schemas.openxmlformats.org/officeDocument/2006/relationships" xmlns:p="http://schemas.openxmlformats.org/presentationml/2006/main">
+  <p:cSld>
+    <p:spTree>
+      <p:nvGrpSpPr>
+        <p:cNvPr id="1" name=""/>
+        <p:cNvGrpSpPr/>
+        <p:nvPr/>
+      </p:nvGrpSpPr>
+      <p:grpSpPr>
+        <a:xfrm>
+          <a:off x="0" y="0"/>
+          <a:ext cx="0" cy="0"/>
+          <a:chOff x="0" y="0"/>
+          <a:chExt cx="0" cy="0"/>
+        </a:xfrm>
+      </p:grpSpPr>
+      <p:sp>
+        <p:nvSpPr>
+          <p:cNvPr id="2" name="슬라이드 이미지 개체 틀 1"/>
+          <p:cNvSpPr>
+            <a:spLocks noGrp="1" noRot="1" noChangeAspect="1"/>
+          </p:cNvSpPr>
+          <p:nvPr>
+            <p:ph type="sldImg"/>
+          </p:nvPr>
+        </p:nvSpPr>
+        <p:spPr/>
+      </p:sp>
+      <p:sp>
+        <p:nvSpPr>
+          <p:cNvPr id="3" name="슬라이드 노트 개체 틀 2"/>
+          <p:cNvSpPr>
+            <a:spLocks noGrp="1"/>
+          </p:cNvSpPr>
+          <p:nvPr>
+            <p:ph type="body" idx="1"/>
+          </p:nvPr>
+        </p:nvSpPr>
+        <p:spPr/>
+        <p:txBody>
+          <a:bodyPr/>
+          <a:lstStyle/>
+          <a:p>
+            <a:r>
+              <a:rPr lang="ko-KR" altLang="en-US" dirty="0"/>
+              <a:t>어떤 종류의 </a:t>
+            </a:r>
+            <a:r>
+              <a:rPr lang="ko-KR" altLang="en-US" dirty="0" err="1"/>
+              <a:t>제로칼로리</a:t>
+            </a:r>
+            <a:r>
+              <a:rPr lang="ko-KR" altLang="en-US" dirty="0"/>
+              <a:t> 음료가 있는지 </a:t>
+            </a:r>
+            <a:r>
+              <a:rPr lang="en-US" altLang="ko-KR" dirty="0"/>
+              <a:t>, </a:t>
+            </a:r>
+            <a:r>
+              <a:rPr lang="ko-KR" altLang="en-US" dirty="0"/>
+              <a:t>해당 음료의 후기는 </a:t>
+            </a:r>
+            <a:r>
+              <a:rPr lang="ko-KR" altLang="en-US" dirty="0" err="1"/>
+              <a:t>어떠한지</a:t>
+            </a:r>
+            <a:r>
+              <a:rPr lang="ko-KR" altLang="en-US" dirty="0"/>
+              <a:t> </a:t>
+            </a:r>
+            <a:r>
+              <a:rPr lang="en-US" altLang="ko-KR" dirty="0"/>
+              <a:t>: </a:t>
+            </a:r>
+            <a:r>
+              <a:rPr lang="ko-KR" altLang="en-US" dirty="0"/>
+              <a:t>맛 </a:t>
+            </a:r>
+            <a:r>
+              <a:rPr lang="en-US" altLang="ko-KR" dirty="0"/>
+              <a:t>, </a:t>
+            </a:r>
+            <a:r>
+              <a:rPr lang="ko-KR" altLang="en-US" dirty="0"/>
+              <a:t>가격 </a:t>
+            </a:r>
+            <a:r>
+              <a:rPr lang="en-US" altLang="ko-KR" dirty="0"/>
+              <a:t>, </a:t>
+            </a:r>
+            <a:r>
+              <a:rPr lang="ko-KR" altLang="en-US" dirty="0"/>
+              <a:t>상품의 질 등</a:t>
+            </a:r>
+          </a:p>
+          <a:p>
+            <a:r>
+              <a:rPr lang="ko-KR" altLang="en-US" dirty="0"/>
+              <a:t>후기를 통해 좀 더 세부적으로 분류가 가능하다</a:t>
+            </a:r>
+            <a:r>
+              <a:rPr lang="en-US" altLang="ko-KR" dirty="0"/>
+              <a:t>.</a:t>
+            </a:r>
+          </a:p>
+          <a:p>
+            <a:endParaRPr lang="en-US" altLang="ko-KR" dirty="0"/>
+          </a:p>
+          <a:p>
+            <a:r>
+              <a:rPr lang="ko-KR" altLang="en-US" dirty="0"/>
+              <a:t>제품의 리뷰에서 언급되어지는 단어들을 모아 </a:t>
+            </a:r>
+            <a:r>
+              <a:rPr lang="ko-KR" altLang="en-US" dirty="0" err="1"/>
+              <a:t>영향력있는</a:t>
+            </a:r>
+            <a:r>
+              <a:rPr lang="ko-KR" altLang="en-US" dirty="0"/>
+              <a:t> 리뷰 단어를 모으고 연관성을 파악하여 해당 </a:t>
+            </a:r>
+            <a:r>
+              <a:rPr lang="ko-KR" altLang="en-US" dirty="0" err="1"/>
+              <a:t>제로칼로리</a:t>
+            </a:r>
+            <a:r>
+              <a:rPr lang="ko-KR" altLang="en-US" dirty="0"/>
+              <a:t> 상품의 주요 키워드를 연관성의 개수만큼 크기를 키워 한 눈에 보여주고 </a:t>
+            </a:r>
+            <a:r>
+              <a:rPr lang="en-US" altLang="ko-KR" dirty="0"/>
+              <a:t>, </a:t>
+            </a:r>
+            <a:r>
+              <a:rPr lang="ko-KR" altLang="en-US" dirty="0"/>
+              <a:t>해당 키워드와 연관된 자료들을 추가로 제공하는 서비스입니다</a:t>
+            </a:r>
+            <a:r>
+              <a:rPr lang="en-US" altLang="ko-KR" dirty="0"/>
+              <a:t>.</a:t>
+            </a:r>
+            <a:endParaRPr lang="ko-KR" altLang="en-US" dirty="0"/>
+          </a:p>
+        </p:txBody>
+      </p:sp>
+      <p:sp>
+        <p:nvSpPr>
+          <p:cNvPr id="4" name="슬라이드 번호 개체 틀 3"/>
+          <p:cNvSpPr>
+            <a:spLocks noGrp="1"/>
+          </p:cNvSpPr>
+          <p:nvPr>
+            <p:ph type="sldNum" sz="quarter" idx="5"/>
+          </p:nvPr>
+        </p:nvSpPr>
+        <p:spPr/>
+        <p:txBody>
+          <a:bodyPr/>
+          <a:lstStyle/>
+          <a:p>
+            <a:fld id="{643D7F1F-6367-4A19-98C0-611AC08B54C6}" type="slidenum">
+              <a:rPr lang="ko-KR" altLang="en-US" smtClean="0"/>
+              <a:t>3</a:t>
+            </a:fld>
+            <a:endParaRPr lang="ko-KR" altLang="en-US"/>
+          </a:p>
+        </p:txBody>
+      </p:sp>
+    </p:spTree>
+    <p:extLst>
+      <p:ext uri="{BB962C8B-B14F-4D97-AF65-F5344CB8AC3E}">
+        <p14:creationId xmlns:p14="http://schemas.microsoft.com/office/powerpoint/2010/main" val="2063728673"/>
+      </p:ext>
+    </p:extLst>
+  </p:cSld>
+  <p:clrMapOvr>
+    <a:masterClrMapping/>
+  </p:clrMapOvr>
+</p:notes>
+</file>
+
+<file path=ppt/notesSlides/notesSlide2.xml><?xml version="1.0" encoding="utf-8"?>
+<p:notes xmlns:a="http://schemas.openxmlformats.org/drawingml/2006/main" xmlns:r="http://schemas.openxmlformats.org/officeDocument/2006/relationships" xmlns:p="http://schemas.openxmlformats.org/presentationml/2006/main">
+  <p:cSld>
+    <p:spTree>
+      <p:nvGrpSpPr>
+        <p:cNvPr id="1" name=""/>
+        <p:cNvGrpSpPr/>
+        <p:nvPr/>
+      </p:nvGrpSpPr>
+      <p:grpSpPr>
+        <a:xfrm>
+          <a:off x="0" y="0"/>
+          <a:ext cx="0" cy="0"/>
+          <a:chOff x="0" y="0"/>
+          <a:chExt cx="0" cy="0"/>
+        </a:xfrm>
+      </p:grpSpPr>
+      <p:sp>
+        <p:nvSpPr>
+          <p:cNvPr id="2" name="슬라이드 이미지 개체 틀 1"/>
+          <p:cNvSpPr>
+            <a:spLocks noGrp="1" noRot="1" noChangeAspect="1"/>
+          </p:cNvSpPr>
+          <p:nvPr>
+            <p:ph type="sldImg"/>
+          </p:nvPr>
+        </p:nvSpPr>
+        <p:spPr/>
+      </p:sp>
+      <p:sp>
+        <p:nvSpPr>
+          <p:cNvPr id="3" name="슬라이드 노트 개체 틀 2"/>
+          <p:cNvSpPr>
+            <a:spLocks noGrp="1"/>
+          </p:cNvSpPr>
+          <p:nvPr>
+            <p:ph type="body" idx="1"/>
+          </p:nvPr>
+        </p:nvSpPr>
+        <p:spPr/>
+        <p:txBody>
+          <a:bodyPr/>
+          <a:lstStyle/>
+          <a:p>
+            <a:endParaRPr lang="ko-KR" altLang="en-US" dirty="0"/>
+          </a:p>
+        </p:txBody>
+      </p:sp>
+      <p:sp>
+        <p:nvSpPr>
+          <p:cNvPr id="4" name="슬라이드 번호 개체 틀 3"/>
+          <p:cNvSpPr>
+            <a:spLocks noGrp="1"/>
+          </p:cNvSpPr>
+          <p:nvPr>
+            <p:ph type="sldNum" sz="quarter" idx="5"/>
+          </p:nvPr>
+        </p:nvSpPr>
+        <p:spPr/>
+        <p:txBody>
+          <a:bodyPr/>
+          <a:lstStyle/>
+          <a:p>
+            <a:fld id="{643D7F1F-6367-4A19-98C0-611AC08B54C6}" type="slidenum">
+              <a:rPr lang="ko-KR" altLang="en-US" smtClean="0"/>
+              <a:t>4</a:t>
+            </a:fld>
+            <a:endParaRPr lang="ko-KR" altLang="en-US"/>
+          </a:p>
+        </p:txBody>
+      </p:sp>
+    </p:spTree>
+    <p:extLst>
+      <p:ext uri="{BB962C8B-B14F-4D97-AF65-F5344CB8AC3E}">
+        <p14:creationId xmlns:p14="http://schemas.microsoft.com/office/powerpoint/2010/main" val="1129582254"/>
+      </p:ext>
+    </p:extLst>
+  </p:cSld>
+  <p:clrMapOvr>
+    <a:masterClrMapping/>
+  </p:clrMapOvr>
+</p:notes>
+</file>
+
+<file path=ppt/notesSlides/notesSlide3.xml><?xml version="1.0" encoding="utf-8"?>
+<p:notes xmlns:a="http://schemas.openxmlformats.org/drawingml/2006/main" xmlns:r="http://schemas.openxmlformats.org/officeDocument/2006/relationships" xmlns:p="http://schemas.openxmlformats.org/presentationml/2006/main">
+  <p:cSld>
+    <p:spTree>
+      <p:nvGrpSpPr>
+        <p:cNvPr id="1" name=""/>
+        <p:cNvGrpSpPr/>
+        <p:nvPr/>
+      </p:nvGrpSpPr>
+      <p:grpSpPr>
+        <a:xfrm>
+          <a:off x="0" y="0"/>
+          <a:ext cx="0" cy="0"/>
+          <a:chOff x="0" y="0"/>
+          <a:chExt cx="0" cy="0"/>
+        </a:xfrm>
+      </p:grpSpPr>
+      <p:sp>
+        <p:nvSpPr>
+          <p:cNvPr id="2" name="슬라이드 이미지 개체 틀 1"/>
+          <p:cNvSpPr>
+            <a:spLocks noGrp="1" noRot="1" noChangeAspect="1"/>
+          </p:cNvSpPr>
+          <p:nvPr>
+            <p:ph type="sldImg"/>
+          </p:nvPr>
+        </p:nvSpPr>
+        <p:spPr/>
+      </p:sp>
+      <p:sp>
+        <p:nvSpPr>
+          <p:cNvPr id="3" name="슬라이드 노트 개체 틀 2"/>
+          <p:cNvSpPr>
+            <a:spLocks noGrp="1"/>
+          </p:cNvSpPr>
+          <p:nvPr>
+            <p:ph type="body" idx="1"/>
+          </p:nvPr>
+        </p:nvSpPr>
+        <p:spPr/>
+        <p:txBody>
+          <a:bodyPr/>
+          <a:lstStyle/>
+          <a:p>
+            <a:r>
+              <a:rPr lang="ko-KR" altLang="en-US" dirty="0"/>
+              <a:t>텍스트 분석에는 </a:t>
+            </a:r>
+            <a:r>
+              <a:rPr lang="ko-KR" altLang="en-US" dirty="0" err="1"/>
+              <a:t>워드클라우드</a:t>
+            </a:r>
+            <a:r>
+              <a:rPr lang="ko-KR" altLang="en-US" dirty="0"/>
+              <a:t> </a:t>
+            </a:r>
+            <a:r>
+              <a:rPr lang="en-US" altLang="ko-KR" dirty="0"/>
+              <a:t>, </a:t>
+            </a:r>
+            <a:r>
+              <a:rPr lang="ko-KR" altLang="en-US" dirty="0"/>
+              <a:t>요약 분석 등이 존재합니다</a:t>
+            </a:r>
+            <a:r>
+              <a:rPr lang="en-US" altLang="ko-KR" dirty="0"/>
+              <a:t>.</a:t>
+            </a:r>
+          </a:p>
+          <a:p>
+            <a:r>
+              <a:rPr lang="ko-KR" altLang="en-US" dirty="0" err="1"/>
+              <a:t>워드클라우드는</a:t>
+            </a:r>
+            <a:r>
+              <a:rPr lang="ko-KR" altLang="en-US" dirty="0"/>
+              <a:t> 단어의 빈도와 </a:t>
+            </a:r>
+            <a:r>
+              <a:rPr lang="ko-KR" altLang="en-US" dirty="0" err="1"/>
+              <a:t>윺용성을</a:t>
+            </a:r>
+            <a:r>
+              <a:rPr lang="ko-KR" altLang="en-US" dirty="0"/>
+              <a:t> 알 수 있지만 </a:t>
+            </a:r>
+            <a:r>
+              <a:rPr lang="ko-KR" altLang="en-US" dirty="0" err="1"/>
+              <a:t>단어간의</a:t>
+            </a:r>
+            <a:r>
+              <a:rPr lang="ko-KR" altLang="en-US" dirty="0"/>
+              <a:t> 연관성을 찾기가 힘듭니다</a:t>
+            </a:r>
+            <a:r>
+              <a:rPr lang="en-US" altLang="ko-KR" dirty="0"/>
+              <a:t>.</a:t>
+            </a:r>
+          </a:p>
+          <a:p>
+            <a:r>
+              <a:rPr lang="ko-KR" altLang="en-US" dirty="0"/>
+              <a:t>요약 분석의 경우 상품에 대한 다양한 후기들의 주요 키워드를 모두 담지 못하여 많은 키워드가 누락되는 단점이 존재합니다</a:t>
+            </a:r>
+            <a:r>
+              <a:rPr lang="en-US" altLang="ko-KR" dirty="0"/>
+              <a:t>.</a:t>
+            </a:r>
+          </a:p>
+          <a:p>
+            <a:endParaRPr lang="en-US" altLang="ko-KR" dirty="0"/>
+          </a:p>
+          <a:p>
+            <a:r>
+              <a:rPr lang="ko-KR" altLang="en-US" dirty="0"/>
+              <a:t>그래서 저희는 텍스트 네트워크 분석을 통하여 단어</a:t>
+            </a:r>
+            <a:r>
+              <a:rPr lang="en-US" altLang="ko-KR" dirty="0"/>
+              <a:t>, </a:t>
+            </a:r>
+            <a:r>
+              <a:rPr lang="ko-KR" altLang="en-US" dirty="0"/>
+              <a:t>즉 키워드 간의 연관성을 확인하고 연관성의 크기가 큰 키워드 및 중요한 키워드를 통해 사용자에게 상품에 대한 정보를 제공하려 합니다</a:t>
+            </a:r>
+          </a:p>
+        </p:txBody>
+      </p:sp>
+      <p:sp>
+        <p:nvSpPr>
+          <p:cNvPr id="4" name="슬라이드 번호 개체 틀 3"/>
+          <p:cNvSpPr>
+            <a:spLocks noGrp="1"/>
+          </p:cNvSpPr>
+          <p:nvPr>
+            <p:ph type="sldNum" sz="quarter" idx="5"/>
+          </p:nvPr>
+        </p:nvSpPr>
+        <p:spPr/>
+        <p:txBody>
+          <a:bodyPr/>
+          <a:lstStyle/>
+          <a:p>
+            <a:fld id="{643D7F1F-6367-4A19-98C0-611AC08B54C6}" type="slidenum">
+              <a:rPr lang="ko-KR" altLang="en-US" smtClean="0"/>
+              <a:t>6</a:t>
+            </a:fld>
+            <a:endParaRPr lang="ko-KR" altLang="en-US"/>
+          </a:p>
+        </p:txBody>
+      </p:sp>
+    </p:spTree>
+    <p:extLst>
+      <p:ext uri="{BB962C8B-B14F-4D97-AF65-F5344CB8AC3E}">
+        <p14:creationId xmlns:p14="http://schemas.microsoft.com/office/powerpoint/2010/main" val="3079949990"/>
+      </p:ext>
+    </p:extLst>
+  </p:cSld>
+  <p:clrMapOvr>
+    <a:masterClrMapping/>
+  </p:clrMapOvr>
+</p:notes>
+</file>
+
+<file path=ppt/notesSlides/notesSlide4.xml><?xml version="1.0" encoding="utf-8"?>
+<p:notes xmlns:a="http://schemas.openxmlformats.org/drawingml/2006/main" xmlns:r="http://schemas.openxmlformats.org/officeDocument/2006/relationships" xmlns:p="http://schemas.openxmlformats.org/presentationml/2006/main">
+  <p:cSld>
+    <p:spTree>
+      <p:nvGrpSpPr>
+        <p:cNvPr id="1" name=""/>
+        <p:cNvGrpSpPr/>
+        <p:nvPr/>
+      </p:nvGrpSpPr>
+      <p:grpSpPr>
+        <a:xfrm>
+          <a:off x="0" y="0"/>
+          <a:ext cx="0" cy="0"/>
+          <a:chOff x="0" y="0"/>
+          <a:chExt cx="0" cy="0"/>
+        </a:xfrm>
+      </p:grpSpPr>
+      <p:sp>
+        <p:nvSpPr>
+          <p:cNvPr id="2" name="슬라이드 이미지 개체 틀 1"/>
+          <p:cNvSpPr>
+            <a:spLocks noGrp="1" noRot="1" noChangeAspect="1"/>
+          </p:cNvSpPr>
+          <p:nvPr>
+            <p:ph type="sldImg"/>
+          </p:nvPr>
+        </p:nvSpPr>
+        <p:spPr/>
+      </p:sp>
+      <p:sp>
+        <p:nvSpPr>
+          <p:cNvPr id="3" name="슬라이드 노트 개체 틀 2"/>
+          <p:cNvSpPr>
+            <a:spLocks noGrp="1"/>
+          </p:cNvSpPr>
+          <p:nvPr>
+            <p:ph type="body" idx="1"/>
+          </p:nvPr>
+        </p:nvSpPr>
+        <p:spPr/>
+        <p:txBody>
+          <a:bodyPr/>
+          <a:lstStyle/>
+          <a:p>
+            <a:endParaRPr lang="ko-KR" altLang="en-US" dirty="0"/>
+          </a:p>
+        </p:txBody>
+      </p:sp>
+      <p:sp>
+        <p:nvSpPr>
+          <p:cNvPr id="4" name="슬라이드 번호 개체 틀 3"/>
+          <p:cNvSpPr>
+            <a:spLocks noGrp="1"/>
+          </p:cNvSpPr>
+          <p:nvPr>
+            <p:ph type="sldNum" sz="quarter" idx="5"/>
+          </p:nvPr>
+        </p:nvSpPr>
+        <p:spPr/>
+        <p:txBody>
+          <a:bodyPr/>
+          <a:lstStyle/>
+          <a:p>
+            <a:fld id="{643D7F1F-6367-4A19-98C0-611AC08B54C6}" type="slidenum">
+              <a:rPr lang="ko-KR" altLang="en-US" smtClean="0"/>
+              <a:t>7</a:t>
+            </a:fld>
+            <a:endParaRPr lang="ko-KR" altLang="en-US"/>
+          </a:p>
+        </p:txBody>
+      </p:sp>
+    </p:spTree>
+    <p:extLst>
+      <p:ext uri="{BB962C8B-B14F-4D97-AF65-F5344CB8AC3E}">
+        <p14:creationId xmlns:p14="http://schemas.microsoft.com/office/powerpoint/2010/main" val="790970911"/>
+      </p:ext>
+    </p:extLst>
+  </p:cSld>
+  <p:clrMapOvr>
+    <a:masterClrMapping/>
+  </p:clrMapOvr>
+</p:notes>
+</file>
+
+<file path=ppt/notesSlides/notesSlide5.xml><?xml version="1.0" encoding="utf-8"?>
+<p:notes xmlns:a="http://schemas.openxmlformats.org/drawingml/2006/main" xmlns:r="http://schemas.openxmlformats.org/officeDocument/2006/relationships" xmlns:p="http://schemas.openxmlformats.org/presentationml/2006/main">
+  <p:cSld>
+    <p:spTree>
+      <p:nvGrpSpPr>
+        <p:cNvPr id="1" name=""/>
+        <p:cNvGrpSpPr/>
+        <p:nvPr/>
+      </p:nvGrpSpPr>
+      <p:grpSpPr>
+        <a:xfrm>
+          <a:off x="0" y="0"/>
+          <a:ext cx="0" cy="0"/>
+          <a:chOff x="0" y="0"/>
+          <a:chExt cx="0" cy="0"/>
+        </a:xfrm>
+      </p:grpSpPr>
+      <p:sp>
+        <p:nvSpPr>
+          <p:cNvPr id="2" name="슬라이드 이미지 개체 틀 1"/>
+          <p:cNvSpPr>
+            <a:spLocks noGrp="1" noRot="1" noChangeAspect="1"/>
+          </p:cNvSpPr>
+          <p:nvPr>
+            <p:ph type="sldImg"/>
+          </p:nvPr>
+        </p:nvSpPr>
+        <p:spPr/>
+      </p:sp>
+      <p:sp>
+        <p:nvSpPr>
+          <p:cNvPr id="3" name="슬라이드 노트 개체 틀 2"/>
+          <p:cNvSpPr>
+            <a:spLocks noGrp="1"/>
+          </p:cNvSpPr>
+          <p:nvPr>
+            <p:ph type="body" idx="1"/>
+          </p:nvPr>
+        </p:nvSpPr>
+        <p:spPr/>
+        <p:txBody>
+          <a:bodyPr/>
+          <a:lstStyle/>
+          <a:p>
+            <a:endParaRPr lang="ko-KR" altLang="en-US" dirty="0"/>
+          </a:p>
+        </p:txBody>
+      </p:sp>
+      <p:sp>
+        <p:nvSpPr>
+          <p:cNvPr id="4" name="슬라이드 번호 개체 틀 3"/>
+          <p:cNvSpPr>
+            <a:spLocks noGrp="1"/>
+          </p:cNvSpPr>
+          <p:nvPr>
+            <p:ph type="sldNum" sz="quarter" idx="5"/>
+          </p:nvPr>
+        </p:nvSpPr>
+        <p:spPr/>
+        <p:txBody>
+          <a:bodyPr/>
+          <a:lstStyle/>
+          <a:p>
+            <a:fld id="{643D7F1F-6367-4A19-98C0-611AC08B54C6}" type="slidenum">
+              <a:rPr lang="ko-KR" altLang="en-US" smtClean="0"/>
+              <a:t>8</a:t>
+            </a:fld>
+            <a:endParaRPr lang="ko-KR" altLang="en-US"/>
+          </a:p>
+        </p:txBody>
+      </p:sp>
+    </p:spTree>
+    <p:extLst>
+      <p:ext uri="{BB962C8B-B14F-4D97-AF65-F5344CB8AC3E}">
+        <p14:creationId xmlns:p14="http://schemas.microsoft.com/office/powerpoint/2010/main" val="3337298280"/>
+      </p:ext>
+    </p:extLst>
+  </p:cSld>
+  <p:clrMapOvr>
+    <a:masterClrMapping/>
+  </p:clrMapOvr>
+</p:notes>
+</file>
+
 <file path=ppt/slideLayouts/slideLayout1.xml><?xml version="1.0" encoding="utf-8"?>
 <p:sldLayout xmlns:a="http://schemas.openxmlformats.org/drawingml/2006/main" xmlns:r="http://schemas.openxmlformats.org/officeDocument/2006/relationships" xmlns:p="http://schemas.openxmlformats.org/presentationml/2006/main" type="title" preserve="1">
   <p:cSld name="Title Slide">
@@ -311,7 +1261,7 @@
           <a:p>
             <a:fld id="{F8166F1F-CE9B-4651-A6AA-CD717754106B}" type="datetimeFigureOut">
               <a:rPr lang="en-US" smtClean="0"/>
-              <a:t>1/5/2023</a:t>
+              <a:t>1/6/2023</a:t>
             </a:fld>
             <a:endParaRPr lang="en-US"/>
           </a:p>
@@ -474,7 +1424,7 @@
           <a:p>
             <a:fld id="{A76116CE-C4A3-4A05-B2D7-7C2E9A889C0F}" type="datetimeFigureOut">
               <a:rPr lang="en-US" smtClean="0"/>
-              <a:t>1/5/2023</a:t>
+              <a:t>1/6/2023</a:t>
             </a:fld>
             <a:endParaRPr lang="en-US"/>
           </a:p>
@@ -647,7 +1597,7 @@
           <a:p>
             <a:fld id="{A76116CE-C4A3-4A05-B2D7-7C2E9A889C0F}" type="datetimeFigureOut">
               <a:rPr lang="en-US" smtClean="0"/>
-              <a:t>1/5/2023</a:t>
+              <a:t>1/6/2023</a:t>
             </a:fld>
             <a:endParaRPr lang="en-US"/>
           </a:p>
@@ -812,7 +1762,7 @@
           <a:p>
             <a:fld id="{A76116CE-C4A3-4A05-B2D7-7C2E9A889C0F}" type="datetimeFigureOut">
               <a:rPr lang="en-US" smtClean="0"/>
-              <a:t>1/5/2023</a:t>
+              <a:t>1/6/2023</a:t>
             </a:fld>
             <a:endParaRPr lang="en-US"/>
           </a:p>
@@ -1052,7 +2002,7 @@
           <a:p>
             <a:fld id="{A76116CE-C4A3-4A05-B2D7-7C2E9A889C0F}" type="datetimeFigureOut">
               <a:rPr lang="en-US" smtClean="0"/>
-              <a:t>1/5/2023</a:t>
+              <a:t>1/6/2023</a:t>
             </a:fld>
             <a:endParaRPr lang="en-US"/>
           </a:p>
@@ -1332,7 +2282,7 @@
           <a:p>
             <a:fld id="{A76116CE-C4A3-4A05-B2D7-7C2E9A889C0F}" type="datetimeFigureOut">
               <a:rPr lang="en-US" smtClean="0"/>
-              <a:t>1/5/2023</a:t>
+              <a:t>1/6/2023</a:t>
             </a:fld>
             <a:endParaRPr lang="en-US"/>
           </a:p>
@@ -1746,7 +2696,7 @@
           <a:p>
             <a:fld id="{A76116CE-C4A3-4A05-B2D7-7C2E9A889C0F}" type="datetimeFigureOut">
               <a:rPr lang="en-US" smtClean="0"/>
-              <a:t>1/5/2023</a:t>
+              <a:t>1/6/2023</a:t>
             </a:fld>
             <a:endParaRPr lang="en-US"/>
           </a:p>
@@ -1858,7 +2808,7 @@
           <a:p>
             <a:fld id="{A76116CE-C4A3-4A05-B2D7-7C2E9A889C0F}" type="datetimeFigureOut">
               <a:rPr lang="en-US" smtClean="0"/>
-              <a:t>1/5/2023</a:t>
+              <a:t>1/6/2023</a:t>
             </a:fld>
             <a:endParaRPr lang="en-US"/>
           </a:p>
@@ -1948,7 +2898,7 @@
           <a:p>
             <a:fld id="{A76116CE-C4A3-4A05-B2D7-7C2E9A889C0F}" type="datetimeFigureOut">
               <a:rPr lang="en-US" smtClean="0"/>
-              <a:t>1/5/2023</a:t>
+              <a:t>1/6/2023</a:t>
             </a:fld>
             <a:endParaRPr lang="en-US"/>
           </a:p>
@@ -2218,7 +3168,7 @@
           <a:p>
             <a:fld id="{A76116CE-C4A3-4A05-B2D7-7C2E9A889C0F}" type="datetimeFigureOut">
               <a:rPr lang="en-US" smtClean="0"/>
-              <a:t>1/5/2023</a:t>
+              <a:t>1/6/2023</a:t>
             </a:fld>
             <a:endParaRPr lang="en-US"/>
           </a:p>
@@ -2465,7 +3415,7 @@
           <a:p>
             <a:fld id="{A76116CE-C4A3-4A05-B2D7-7C2E9A889C0F}" type="datetimeFigureOut">
               <a:rPr lang="en-US" smtClean="0"/>
-              <a:t>1/5/2023</a:t>
+              <a:t>1/6/2023</a:t>
             </a:fld>
             <a:endParaRPr lang="en-US"/>
           </a:p>
@@ -2671,7 +3621,7 @@
           <a:p>
             <a:fld id="{F8166F1F-CE9B-4651-A6AA-CD717754106B}" type="datetimeFigureOut">
               <a:rPr lang="en-US" smtClean="0"/>
-              <a:t>1/5/2023</a:t>
+              <a:t>1/6/2023</a:t>
             </a:fld>
             <a:endParaRPr lang="en-US"/>
           </a:p>
@@ -3137,174 +4087,6 @@
               <a:latin typeface="THELuxGoL" pitchFamily="34" charset="0"/>
               <a:cs typeface="THELuxGoL" pitchFamily="34" charset="0"/>
             </a:endParaRPr>
-          </a:p>
-        </p:txBody>
-      </p:sp>
-    </p:spTree>
-  </p:cSld>
-  <p:clrMapOvr>
-    <a:masterClrMapping/>
-  </p:clrMapOvr>
-</p:sld>
-</file>
-
-<file path=ppt/slides/slide10.xml><?xml version="1.0" encoding="utf-8"?>
-<p:sld xmlns:a="http://schemas.openxmlformats.org/drawingml/2006/main" xmlns:r="http://schemas.openxmlformats.org/officeDocument/2006/relationships" xmlns:p="http://schemas.openxmlformats.org/presentationml/2006/main">
-  <p:cSld name="Slide 6">
-    <p:bg>
-      <p:bgPr>
-        <a:solidFill>
-          <a:srgbClr val="BFBFBF"/>
-        </a:solidFill>
-        <a:effectLst/>
-      </p:bgPr>
-    </p:bg>
-    <p:spTree>
-      <p:nvGrpSpPr>
-        <p:cNvPr id="1" name=""/>
-        <p:cNvGrpSpPr/>
-        <p:nvPr/>
-      </p:nvGrpSpPr>
-      <p:grpSpPr>
-        <a:xfrm>
-          <a:off x="0" y="0"/>
-          <a:ext cx="0" cy="0"/>
-          <a:chOff x="0" y="0"/>
-          <a:chExt cx="0" cy="0"/>
-        </a:xfrm>
-      </p:grpSpPr>
-      <p:sp>
-        <p:nvSpPr>
-          <p:cNvPr id="3" name="Object 3"/>
-          <p:cNvSpPr txBox="1"/>
-          <p:nvPr/>
-        </p:nvSpPr>
-        <p:spPr>
-          <a:xfrm>
-            <a:off x="1114286" y="776257"/>
-            <a:ext cx="10214286" cy="1154162"/>
-          </a:xfrm>
-          <a:prstGeom prst="rect">
-            <a:avLst/>
-          </a:prstGeom>
-          <a:noFill/>
-        </p:spPr>
-        <p:txBody>
-          <a:bodyPr wrap="square" rtlCol="0" anchor="t">
-            <a:spAutoFit/>
-          </a:bodyPr>
-          <a:lstStyle/>
-          <a:p>
-            <a:r>
-              <a:rPr lang="ko-KR" altLang="en-US" sz="6900" kern="0" spc="-300" dirty="0">
-                <a:solidFill>
-                  <a:srgbClr val="40514E"/>
-                </a:solidFill>
-                <a:latin typeface="THELuxGoB" pitchFamily="34" charset="0"/>
-                <a:cs typeface="THELuxGoB" pitchFamily="34" charset="0"/>
-              </a:rPr>
-              <a:t>감사합니다</a:t>
-            </a:r>
-            <a:r>
-              <a:rPr lang="en-US" altLang="ko-KR" sz="6900" kern="0" spc="-300" dirty="0">
-                <a:solidFill>
-                  <a:srgbClr val="40514E"/>
-                </a:solidFill>
-                <a:latin typeface="THELuxGoB" pitchFamily="34" charset="0"/>
-                <a:cs typeface="THELuxGoB" pitchFamily="34" charset="0"/>
-              </a:rPr>
-              <a:t>.</a:t>
-            </a:r>
-            <a:endParaRPr lang="en-US" dirty="0"/>
-          </a:p>
-        </p:txBody>
-      </p:sp>
-      <p:sp>
-        <p:nvSpPr>
-          <p:cNvPr id="5" name="TextBox 4">
-            <a:extLst>
-              <a:ext uri="{FF2B5EF4-FFF2-40B4-BE49-F238E27FC236}">
-                <a16:creationId xmlns:a16="http://schemas.microsoft.com/office/drawing/2014/main" id="{F57E3F61-EE0D-2F16-670E-39757E7DFEF1}"/>
-              </a:ext>
-            </a:extLst>
-          </p:cNvPr>
-          <p:cNvSpPr txBox="1"/>
-          <p:nvPr/>
-        </p:nvSpPr>
-        <p:spPr>
-          <a:xfrm>
-            <a:off x="1114286" y="2705100"/>
-            <a:ext cx="7162800" cy="3693319"/>
-          </a:xfrm>
-          <a:prstGeom prst="rect">
-            <a:avLst/>
-          </a:prstGeom>
-          <a:solidFill>
-            <a:srgbClr val="C00000"/>
-          </a:solidFill>
-        </p:spPr>
-        <p:txBody>
-          <a:bodyPr wrap="square" rtlCol="0">
-            <a:spAutoFit/>
-          </a:bodyPr>
-          <a:lstStyle/>
-          <a:p>
-            <a:r>
-              <a:rPr lang="ko-KR" altLang="en-US" dirty="0"/>
-              <a:t>참고자료</a:t>
-            </a:r>
-            <a:endParaRPr lang="en-US" altLang="ko-KR" dirty="0"/>
-          </a:p>
-          <a:p>
-            <a:endParaRPr lang="en-US" altLang="ko-KR" dirty="0"/>
-          </a:p>
-          <a:p>
-            <a:r>
-              <a:rPr lang="ko-KR" altLang="en-US" dirty="0"/>
-              <a:t>제로 탄산 음료 시장 분석</a:t>
-            </a:r>
-            <a:endParaRPr lang="en-US" altLang="ko-KR" dirty="0"/>
-          </a:p>
-          <a:p>
-            <a:r>
-              <a:rPr lang="en-US" altLang="ko-KR" dirty="0"/>
-              <a:t>https://www.wiseapp.co.kr/insight/detail/217</a:t>
-            </a:r>
-          </a:p>
-          <a:p>
-            <a:endParaRPr lang="en-US" altLang="ko-KR" dirty="0"/>
-          </a:p>
-          <a:p>
-            <a:r>
-              <a:rPr lang="ko-KR" altLang="en-US" dirty="0">
-                <a:highlight>
-                  <a:srgbClr val="FFFF00"/>
-                </a:highlight>
-              </a:rPr>
-              <a:t>텍스트 네트워크 학술자료</a:t>
-            </a:r>
-            <a:endParaRPr lang="en-US" altLang="ko-KR" dirty="0">
-              <a:highlight>
-                <a:srgbClr val="FFFF00"/>
-              </a:highlight>
-            </a:endParaRPr>
-          </a:p>
-          <a:p>
-            <a:endParaRPr lang="en-US" altLang="ko-KR" dirty="0"/>
-          </a:p>
-          <a:p>
-            <a:r>
-              <a:rPr lang="ko-KR" altLang="en-US" dirty="0"/>
-              <a:t>홈페이지 예시</a:t>
-            </a:r>
-            <a:endParaRPr lang="en-US" altLang="ko-KR" dirty="0"/>
-          </a:p>
-          <a:p>
-            <a:r>
-              <a:rPr lang="en-US" altLang="ko-KR" dirty="0"/>
-              <a:t>https://ko.wix.com/website-template/view/html/3078?originUrl=https%3A%2F%2Fko.wix.com%2Fwebsite%2Ftemplates%2Fhtml%2Frestaurants-food%2Ffood-drinks%2F2&amp;tpClick=view_button&amp;esi=e2392428-b879-4790-839b-fd15ccb21026</a:t>
-            </a:r>
-            <a:endParaRPr lang="ko-KR" altLang="en-US" dirty="0"/>
           </a:p>
         </p:txBody>
       </p:sp>
@@ -4261,7 +5043,7 @@
                   </a:schemeClr>
                 </a:solidFill>
               </a:rPr>
-              <a:t>모델링</a:t>
+              <a:t>데이터 분석</a:t>
             </a:r>
             <a:endParaRPr lang="en-US" altLang="ko-KR" sz="2800" b="1" dirty="0">
               <a:solidFill>
@@ -4478,8 +5260,8 @@
         </p:nvSpPr>
         <p:spPr>
           <a:xfrm>
-            <a:off x="10989335" y="3199380"/>
-            <a:ext cx="6993866" cy="2865397"/>
+            <a:off x="10952670" y="3333908"/>
+            <a:ext cx="6993866" cy="2274802"/>
           </a:xfrm>
           <a:prstGeom prst="roundRect">
             <a:avLst/>
@@ -4572,7 +5354,7 @@
             <p:nvPr/>
           </p:nvPicPr>
           <p:blipFill>
-            <a:blip r:embed="rId2" cstate="print"/>
+            <a:blip r:embed="rId3" cstate="print"/>
             <a:stretch>
               <a:fillRect/>
             </a:stretch>
@@ -4648,7 +5430,7 @@
             <p:nvPr/>
           </p:nvPicPr>
           <p:blipFill>
-            <a:blip r:embed="rId3" cstate="print"/>
+            <a:blip r:embed="rId4" cstate="print"/>
             <a:stretch>
               <a:fillRect/>
             </a:stretch>
@@ -4687,7 +5469,7 @@
             <p:nvPr/>
           </p:nvPicPr>
           <p:blipFill>
-            <a:blip r:embed="rId4" cstate="print"/>
+            <a:blip r:embed="rId5" cstate="print"/>
             <a:stretch>
               <a:fillRect/>
             </a:stretch>
@@ -4793,7 +5575,7 @@
                 <a:latin typeface="THELuxGoB" pitchFamily="34" charset="0"/>
                 <a:cs typeface="THELuxGoB" pitchFamily="34" charset="0"/>
               </a:rPr>
-              <a:t> 음료들의 상품 리뷰 키워드를 분석하여 서비스 소비자에게 정보를 제공</a:t>
+              <a:t> 음료들의 상품 리뷰를 네트워크 분석을 통해 서비스 사용자에게 정보 제공</a:t>
             </a:r>
             <a:endParaRPr lang="en-US" altLang="ko-KR" sz="2400" kern="0" spc="-100" dirty="0">
               <a:solidFill>
@@ -4928,7 +5710,7 @@
           <a:p>
             <a:r>
               <a:rPr lang="ko-KR" altLang="en-US" sz="2800" b="1" dirty="0"/>
-              <a:t>서비스 소비자</a:t>
+              <a:t>서비스 사용자</a:t>
             </a:r>
           </a:p>
         </p:txBody>
@@ -5011,60 +5793,8 @@
           <a:p>
             <a:r>
               <a:rPr lang="ko-KR" altLang="en-US" sz="2800" b="1" dirty="0"/>
-              <a:t>리뷰 키워드</a:t>
-            </a:r>
-          </a:p>
-        </p:txBody>
-      </p:sp>
-      <p:sp>
-        <p:nvSpPr>
-          <p:cNvPr id="21" name="TextBox 20">
-            <a:extLst>
-              <a:ext uri="{FF2B5EF4-FFF2-40B4-BE49-F238E27FC236}">
-                <a16:creationId xmlns:a16="http://schemas.microsoft.com/office/drawing/2014/main" id="{D618EA4E-AD77-FFE5-66F1-E47F61A42527}"/>
-              </a:ext>
-            </a:extLst>
-          </p:cNvPr>
-          <p:cNvSpPr txBox="1"/>
-          <p:nvPr/>
-        </p:nvSpPr>
-        <p:spPr>
-          <a:xfrm>
-            <a:off x="11506200" y="5442468"/>
-            <a:ext cx="7566896" cy="338554"/>
-          </a:xfrm>
-          <a:prstGeom prst="rect">
-            <a:avLst/>
-          </a:prstGeom>
-          <a:noFill/>
-        </p:spPr>
-        <p:txBody>
-          <a:bodyPr wrap="square" rtlCol="0">
-            <a:spAutoFit/>
-          </a:bodyPr>
-          <a:lstStyle/>
-          <a:p>
-            <a:r>
-              <a:rPr lang="en-US" altLang="ko-KR" sz="1600" dirty="0">
-                <a:latin typeface="+mn-ea"/>
-              </a:rPr>
-              <a:t>-</a:t>
-            </a:r>
-            <a:r>
-              <a:rPr lang="ko-KR" altLang="en-US" sz="1600" dirty="0">
-                <a:latin typeface="+mn-ea"/>
-              </a:rPr>
-              <a:t> 서비스 소비자는 상품 리뷰를 받아들이는 방식의 차이에 따라 다르다</a:t>
-            </a:r>
-            <a:r>
-              <a:rPr lang="en-US" altLang="ko-KR" sz="1600" dirty="0">
-                <a:latin typeface="+mn-ea"/>
-              </a:rPr>
-              <a:t>.</a:t>
-            </a:r>
-            <a:endParaRPr lang="ko-KR" altLang="en-US" sz="1600" dirty="0">
-              <a:latin typeface="+mn-ea"/>
-            </a:endParaRPr>
+              <a:t>네트워크 분석</a:t>
+            </a:r>
           </a:p>
         </p:txBody>
       </p:sp>
@@ -5100,7 +5830,7 @@
               <a:rPr lang="ko-KR" altLang="en-US" sz="2800" b="1" dirty="0">
                 <a:latin typeface="+mn-ea"/>
               </a:rPr>
-              <a:t>서비스 소비자</a:t>
+              <a:t>서비스 사용자</a:t>
             </a:r>
             <a:endParaRPr lang="en-US" altLang="ko-KR" sz="2800" b="1" dirty="0">
               <a:latin typeface="+mn-ea"/>
@@ -5522,7 +6252,7 @@
           <p:nvPr/>
         </p:nvPicPr>
         <p:blipFill>
-          <a:blip r:embed="rId2"/>
+          <a:blip r:embed="rId3"/>
           <a:stretch>
             <a:fillRect/>
           </a:stretch>
@@ -5667,7 +6397,7 @@
           <p:nvPr/>
         </p:nvPicPr>
         <p:blipFill>
-          <a:blip r:embed="rId3"/>
+          <a:blip r:embed="rId4"/>
           <a:stretch>
             <a:fillRect/>
           </a:stretch>
@@ -5717,7 +6447,7 @@
             <p:nvPr/>
           </p:nvPicPr>
           <p:blipFill>
-            <a:blip r:embed="rId4"/>
+            <a:blip r:embed="rId5"/>
             <a:stretch>
               <a:fillRect/>
             </a:stretch>
@@ -5747,7 +6477,7 @@
             <p:nvPr/>
           </p:nvPicPr>
           <p:blipFill>
-            <a:blip r:embed="rId5"/>
+            <a:blip r:embed="rId6"/>
             <a:stretch>
               <a:fillRect/>
             </a:stretch>
@@ -6380,7 +7110,7 @@
           <p:nvPr/>
         </p:nvPicPr>
         <p:blipFill>
-          <a:blip r:embed="rId2"/>
+          <a:blip r:embed="rId3"/>
           <a:stretch>
             <a:fillRect/>
           </a:stretch>
@@ -6410,7 +7140,7 @@
           <p:nvPr/>
         </p:nvPicPr>
         <p:blipFill>
-          <a:blip r:embed="rId3"/>
+          <a:blip r:embed="rId4"/>
           <a:stretch>
             <a:fillRect/>
           </a:stretch>
@@ -6486,132 +7216,20 @@
   <p:clrMapOvr>
     <a:masterClrMapping/>
   </p:clrMapOvr>
-  <p:timing>
-    <p:tnLst>
-      <p:par>
-        <p:cTn id="1" dur="indefinite" restart="never" nodeType="tmRoot">
-          <p:childTnLst>
-            <p:seq concurrent="1" nextAc="seek">
-              <p:cTn id="2" dur="indefinite" nodeType="mainSeq">
-                <p:childTnLst>
-                  <p:par>
-                    <p:cTn id="3" fill="hold">
-                      <p:stCondLst>
-                        <p:cond delay="indefinite"/>
-                      </p:stCondLst>
-                      <p:childTnLst>
-                        <p:par>
-                          <p:cTn id="4" fill="hold">
-                            <p:stCondLst>
-                              <p:cond delay="0"/>
-                            </p:stCondLst>
-                            <p:childTnLst>
-                              <p:par>
-                                <p:cTn id="5" presetID="1" presetClass="entr" presetSubtype="0" fill="hold" nodeType="clickEffect">
-                                  <p:stCondLst>
-                                    <p:cond delay="0"/>
-                                  </p:stCondLst>
-                                  <p:childTnLst>
-                                    <p:set>
-                                      <p:cBhvr>
-                                        <p:cTn id="6" dur="1" fill="hold">
-                                          <p:stCondLst>
-                                            <p:cond delay="0"/>
-                                          </p:stCondLst>
-                                        </p:cTn>
-                                        <p:tgtEl>
-                                          <p:spTgt spid="8"/>
-                                        </p:tgtEl>
-                                        <p:attrNameLst>
-                                          <p:attrName>style.visibility</p:attrName>
-                                        </p:attrNameLst>
-                                      </p:cBhvr>
-                                      <p:to>
-                                        <p:strVal val="visible"/>
-                                      </p:to>
-                                    </p:set>
-                                  </p:childTnLst>
-                                </p:cTn>
-                              </p:par>
-                            </p:childTnLst>
-                          </p:cTn>
-                        </p:par>
-                      </p:childTnLst>
-                    </p:cTn>
-                  </p:par>
-                  <p:par>
-                    <p:cTn id="7" fill="hold">
-                      <p:stCondLst>
-                        <p:cond delay="indefinite"/>
-                      </p:stCondLst>
-                      <p:childTnLst>
-                        <p:par>
-                          <p:cTn id="8" fill="hold">
-                            <p:stCondLst>
-                              <p:cond delay="0"/>
-                            </p:stCondLst>
-                            <p:childTnLst>
-                              <p:par>
-                                <p:cTn id="9" presetID="1" presetClass="entr" presetSubtype="0" fill="hold" nodeType="clickEffect">
-                                  <p:stCondLst>
-                                    <p:cond delay="0"/>
-                                  </p:stCondLst>
-                                  <p:childTnLst>
-                                    <p:set>
-                                      <p:cBhvr>
-                                        <p:cTn id="10" dur="1" fill="hold">
-                                          <p:stCondLst>
-                                            <p:cond delay="0"/>
-                                          </p:stCondLst>
-                                        </p:cTn>
-                                        <p:tgtEl>
-                                          <p:spTgt spid="14"/>
-                                        </p:tgtEl>
-                                        <p:attrNameLst>
-                                          <p:attrName>style.visibility</p:attrName>
-                                        </p:attrNameLst>
-                                      </p:cBhvr>
-                                      <p:to>
-                                        <p:strVal val="visible"/>
-                                      </p:to>
-                                    </p:set>
-                                  </p:childTnLst>
-                                </p:cTn>
-                              </p:par>
-                            </p:childTnLst>
-                          </p:cTn>
-                        </p:par>
-                      </p:childTnLst>
-                    </p:cTn>
-                  </p:par>
-                </p:childTnLst>
-              </p:cTn>
-              <p:prevCondLst>
-                <p:cond evt="onPrev" delay="0">
-                  <p:tgtEl>
-                    <p:sldTgt/>
-                  </p:tgtEl>
-                </p:cond>
-              </p:prevCondLst>
-              <p:nextCondLst>
-                <p:cond evt="onNext" delay="0">
-                  <p:tgtEl>
-                    <p:sldTgt/>
-                  </p:tgtEl>
-                </p:cond>
-              </p:nextCondLst>
-            </p:seq>
-          </p:childTnLst>
-        </p:cTn>
-      </p:par>
-    </p:tnLst>
-  </p:timing>
 </p:sld>
 </file>
 
 <file path=ppt/slides/slide7.xml><?xml version="1.0" encoding="utf-8"?>
 <p:sld xmlns:a="http://schemas.openxmlformats.org/drawingml/2006/main" xmlns:r="http://schemas.openxmlformats.org/officeDocument/2006/relationships" xmlns:p="http://schemas.openxmlformats.org/presentationml/2006/main">
   <p:cSld>
+    <p:bg>
+      <p:bgPr>
+        <a:solidFill>
+          <a:srgbClr val="BFBFBF"/>
+        </a:solidFill>
+        <a:effectLst/>
+      </p:bgPr>
+    </p:bg>
     <p:spTree>
       <p:nvGrpSpPr>
         <p:cNvPr id="1" name=""/>
@@ -6628,491 +7246,6 @@
       </p:grpSpPr>
       <p:sp>
         <p:nvSpPr>
-          <p:cNvPr id="34" name="직사각형 33">
-            <a:extLst>
-              <a:ext uri="{FF2B5EF4-FFF2-40B4-BE49-F238E27FC236}">
-                <a16:creationId xmlns:a16="http://schemas.microsoft.com/office/drawing/2014/main" id="{987AA7DE-5E26-C0DD-9705-6843B4608AE1}"/>
-              </a:ext>
-            </a:extLst>
-          </p:cNvPr>
-          <p:cNvSpPr/>
-          <p:nvPr/>
-        </p:nvSpPr>
-        <p:spPr>
-          <a:xfrm>
-            <a:off x="11134546" y="4229100"/>
-            <a:ext cx="6168017" cy="1653713"/>
-          </a:xfrm>
-          <a:prstGeom prst="rect">
-            <a:avLst/>
-          </a:prstGeom>
-          <a:solidFill>
-            <a:schemeClr val="bg1"/>
-          </a:solidFill>
-          <a:ln>
-            <a:noFill/>
-          </a:ln>
-        </p:spPr>
-        <p:style>
-          <a:lnRef idx="2">
-            <a:schemeClr val="accent1">
-              <a:shade val="50000"/>
-            </a:schemeClr>
-          </a:lnRef>
-          <a:fillRef idx="1">
-            <a:schemeClr val="accent1"/>
-          </a:fillRef>
-          <a:effectRef idx="0">
-            <a:schemeClr val="accent1"/>
-          </a:effectRef>
-          <a:fontRef idx="minor">
-            <a:schemeClr val="lt1"/>
-          </a:fontRef>
-        </p:style>
-        <p:txBody>
-          <a:bodyPr rtlCol="0" anchor="ctr"/>
-          <a:lstStyle/>
-          <a:p>
-            <a:pPr algn="just"/>
-            <a:r>
-              <a:rPr lang="ko-KR" altLang="en-US" b="1" dirty="0">
-                <a:solidFill>
-                  <a:schemeClr val="tx1"/>
-                </a:solidFill>
-              </a:rPr>
-              <a:t>띄어쓰기 수정</a:t>
-            </a:r>
-            <a:endParaRPr lang="en-US" altLang="ko-KR" b="1" dirty="0">
-              <a:solidFill>
-                <a:schemeClr val="tx1"/>
-              </a:solidFill>
-            </a:endParaRPr>
-          </a:p>
-          <a:p>
-            <a:pPr algn="just"/>
-            <a:r>
-              <a:rPr lang="ko-KR" altLang="en-US" b="1" dirty="0">
-                <a:solidFill>
-                  <a:schemeClr val="tx1"/>
-                </a:solidFill>
-              </a:rPr>
-              <a:t>맞춤법 교정</a:t>
-            </a:r>
-            <a:endParaRPr lang="en-US" altLang="ko-KR" b="1" dirty="0">
-              <a:solidFill>
-                <a:schemeClr val="tx1"/>
-              </a:solidFill>
-            </a:endParaRPr>
-          </a:p>
-          <a:p>
-            <a:pPr algn="just"/>
-            <a:r>
-              <a:rPr lang="ko-KR" altLang="en-US" b="1" dirty="0">
-                <a:solidFill>
-                  <a:schemeClr val="tx1"/>
-                </a:solidFill>
-              </a:rPr>
-              <a:t>형태소 분석 </a:t>
-            </a:r>
-            <a:r>
-              <a:rPr lang="en-US" altLang="ko-KR" b="1" dirty="0">
-                <a:solidFill>
-                  <a:schemeClr val="tx1"/>
-                </a:solidFill>
-              </a:rPr>
-              <a:t>: </a:t>
-            </a:r>
-            <a:r>
-              <a:rPr lang="en-US" altLang="ko-KR" b="1" dirty="0" err="1">
-                <a:solidFill>
-                  <a:schemeClr val="tx1"/>
-                </a:solidFill>
-              </a:rPr>
-              <a:t>Okt</a:t>
-            </a:r>
-            <a:r>
-              <a:rPr lang="en-US" altLang="ko-KR" b="1" dirty="0">
-                <a:solidFill>
-                  <a:schemeClr val="tx1"/>
-                </a:solidFill>
-              </a:rPr>
-              <a:t>, </a:t>
-            </a:r>
-            <a:r>
-              <a:rPr lang="en-US" altLang="ko-KR" b="1" dirty="0" err="1">
-                <a:solidFill>
-                  <a:schemeClr val="tx1"/>
-                </a:solidFill>
-              </a:rPr>
-              <a:t>Mecab</a:t>
-            </a:r>
-            <a:r>
-              <a:rPr lang="en-US" altLang="ko-KR" b="1" dirty="0">
-                <a:solidFill>
-                  <a:schemeClr val="tx1"/>
-                </a:solidFill>
-              </a:rPr>
-              <a:t> , </a:t>
-            </a:r>
-            <a:r>
-              <a:rPr lang="en-US" altLang="ko-KR" b="1" dirty="0" err="1">
-                <a:solidFill>
-                  <a:schemeClr val="tx1"/>
-                </a:solidFill>
-              </a:rPr>
-              <a:t>Komoran</a:t>
-            </a:r>
-            <a:r>
-              <a:rPr lang="en-US" altLang="ko-KR" b="1" dirty="0">
-                <a:solidFill>
-                  <a:schemeClr val="tx1"/>
-                </a:solidFill>
-              </a:rPr>
-              <a:t> , </a:t>
-            </a:r>
-            <a:r>
-              <a:rPr lang="en-US" altLang="ko-KR" b="1" dirty="0" err="1">
-                <a:solidFill>
-                  <a:schemeClr val="tx1"/>
-                </a:solidFill>
-              </a:rPr>
-              <a:t>Kkma</a:t>
-            </a:r>
-            <a:r>
-              <a:rPr lang="en-US" altLang="ko-KR" b="1" dirty="0">
-                <a:solidFill>
-                  <a:schemeClr val="tx1"/>
-                </a:solidFill>
-              </a:rPr>
-              <a:t> , </a:t>
-            </a:r>
-            <a:r>
-              <a:rPr lang="en-US" altLang="ko-KR" b="1" dirty="0" err="1">
-                <a:solidFill>
-                  <a:schemeClr val="tx1"/>
-                </a:solidFill>
-              </a:rPr>
-              <a:t>Kaiii</a:t>
-            </a:r>
-            <a:endParaRPr lang="ko-KR" altLang="en-US" b="1" dirty="0">
-              <a:solidFill>
-                <a:schemeClr val="tx1"/>
-              </a:solidFill>
-            </a:endParaRPr>
-          </a:p>
-        </p:txBody>
-      </p:sp>
-      <p:sp>
-        <p:nvSpPr>
-          <p:cNvPr id="2" name="Object 2"/>
-          <p:cNvSpPr txBox="1"/>
-          <p:nvPr/>
-        </p:nvSpPr>
-        <p:spPr>
-          <a:xfrm>
-            <a:off x="2555056" y="456442"/>
-            <a:ext cx="10627544" cy="1154162"/>
-          </a:xfrm>
-          <a:prstGeom prst="rect">
-            <a:avLst/>
-          </a:prstGeom>
-          <a:noFill/>
-        </p:spPr>
-        <p:txBody>
-          <a:bodyPr wrap="square" rtlCol="0" anchor="t">
-            <a:spAutoFit/>
-          </a:bodyPr>
-          <a:lstStyle/>
-          <a:p>
-            <a:r>
-              <a:rPr lang="ko-KR" altLang="en-US" sz="6900" kern="0" spc="-300" dirty="0">
-                <a:solidFill>
-                  <a:schemeClr val="tx1">
-                    <a:lumMod val="65000"/>
-                    <a:lumOff val="35000"/>
-                  </a:schemeClr>
-                </a:solidFill>
-                <a:latin typeface="THELuxGoB" pitchFamily="34" charset="0"/>
-                <a:cs typeface="THELuxGoB" pitchFamily="34" charset="0"/>
-              </a:rPr>
-              <a:t>모델링</a:t>
-            </a:r>
-            <a:r>
-              <a:rPr lang="en-US" altLang="ko-KR" sz="6900" kern="0" spc="-300" dirty="0">
-                <a:solidFill>
-                  <a:schemeClr val="tx1">
-                    <a:lumMod val="65000"/>
-                    <a:lumOff val="35000"/>
-                  </a:schemeClr>
-                </a:solidFill>
-                <a:latin typeface="THELuxGoB" pitchFamily="34" charset="0"/>
-                <a:cs typeface="THELuxGoB" pitchFamily="34" charset="0"/>
-              </a:rPr>
-              <a:t>?? </a:t>
-            </a:r>
-            <a:r>
-              <a:rPr lang="ko-KR" altLang="en-US" sz="6900" kern="0" spc="-300" dirty="0">
-                <a:solidFill>
-                  <a:schemeClr val="tx1">
-                    <a:lumMod val="65000"/>
-                    <a:lumOff val="35000"/>
-                  </a:schemeClr>
-                </a:solidFill>
-                <a:latin typeface="THELuxGoB" pitchFamily="34" charset="0"/>
-                <a:cs typeface="THELuxGoB" pitchFamily="34" charset="0"/>
-              </a:rPr>
-              <a:t>이 없었네</a:t>
-            </a:r>
-            <a:r>
-              <a:rPr lang="en-US" altLang="ko-KR" sz="6900" kern="0" spc="-300" dirty="0">
-                <a:solidFill>
-                  <a:schemeClr val="tx1">
-                    <a:lumMod val="65000"/>
-                    <a:lumOff val="35000"/>
-                  </a:schemeClr>
-                </a:solidFill>
-                <a:latin typeface="THELuxGoB" pitchFamily="34" charset="0"/>
-                <a:cs typeface="THELuxGoB" pitchFamily="34" charset="0"/>
-              </a:rPr>
-              <a:t>..</a:t>
-            </a:r>
-            <a:r>
-              <a:rPr lang="ko-KR" altLang="en-US" sz="6900" kern="0" spc="-300" dirty="0" err="1">
-                <a:solidFill>
-                  <a:schemeClr val="tx1">
-                    <a:lumMod val="65000"/>
-                    <a:lumOff val="35000"/>
-                  </a:schemeClr>
-                </a:solidFill>
-                <a:latin typeface="THELuxGoB" pitchFamily="34" charset="0"/>
-                <a:cs typeface="THELuxGoB" pitchFamily="34" charset="0"/>
-              </a:rPr>
-              <a:t>ㅇㅁㅇ</a:t>
-            </a:r>
-            <a:r>
-              <a:rPr lang="en-US" altLang="ko-KR" sz="6900" kern="0" spc="-300" dirty="0">
-                <a:solidFill>
-                  <a:schemeClr val="tx1">
-                    <a:lumMod val="65000"/>
-                    <a:lumOff val="35000"/>
-                  </a:schemeClr>
-                </a:solidFill>
-                <a:latin typeface="THELuxGoB" pitchFamily="34" charset="0"/>
-                <a:cs typeface="THELuxGoB" pitchFamily="34" charset="0"/>
-              </a:rPr>
-              <a:t>!</a:t>
-            </a:r>
-            <a:endParaRPr lang="en-US" dirty="0"/>
-          </a:p>
-        </p:txBody>
-      </p:sp>
-      <p:sp>
-        <p:nvSpPr>
-          <p:cNvPr id="6" name="Object 6"/>
-          <p:cNvSpPr txBox="1"/>
-          <p:nvPr/>
-        </p:nvSpPr>
-        <p:spPr>
-          <a:xfrm>
-            <a:off x="-1204043" y="184393"/>
-            <a:ext cx="3071429" cy="1708160"/>
-          </a:xfrm>
-          <a:prstGeom prst="rect">
-            <a:avLst/>
-          </a:prstGeom>
-          <a:noFill/>
-        </p:spPr>
-        <p:txBody>
-          <a:bodyPr wrap="square" rtlCol="0" anchor="t">
-            <a:spAutoFit/>
-          </a:bodyPr>
-          <a:lstStyle/>
-          <a:p>
-            <a:pPr algn="r"/>
-            <a:r>
-              <a:rPr lang="en-US" sz="10500" dirty="0">
-                <a:solidFill>
-                  <a:srgbClr val="40514E"/>
-                </a:solidFill>
-                <a:latin typeface="Bebas Neue" pitchFamily="34" charset="0"/>
-                <a:cs typeface="Bebas Neue" pitchFamily="34" charset="0"/>
-              </a:rPr>
-              <a:t>03</a:t>
-            </a:r>
-            <a:endParaRPr lang="en-US" dirty="0"/>
-          </a:p>
-        </p:txBody>
-      </p:sp>
-      <p:sp>
-        <p:nvSpPr>
-          <p:cNvPr id="12" name="TextBox 11">
-            <a:extLst>
-              <a:ext uri="{FF2B5EF4-FFF2-40B4-BE49-F238E27FC236}">
-                <a16:creationId xmlns:a16="http://schemas.microsoft.com/office/drawing/2014/main" id="{5440355A-4A59-DB80-0BA9-613C883CE176}"/>
-              </a:ext>
-            </a:extLst>
-          </p:cNvPr>
-          <p:cNvSpPr txBox="1"/>
-          <p:nvPr/>
-        </p:nvSpPr>
-        <p:spPr>
-          <a:xfrm>
-            <a:off x="1867386" y="2335391"/>
-            <a:ext cx="4457214" cy="646331"/>
-          </a:xfrm>
-          <a:prstGeom prst="rect">
-            <a:avLst/>
-          </a:prstGeom>
-          <a:noFill/>
-        </p:spPr>
-        <p:txBody>
-          <a:bodyPr wrap="square" rtlCol="0">
-            <a:spAutoFit/>
-          </a:bodyPr>
-          <a:lstStyle/>
-          <a:p>
-            <a:r>
-              <a:rPr lang="ko-KR" altLang="en-US" sz="3600" dirty="0">
-                <a:solidFill>
-                  <a:srgbClr val="40514E"/>
-                </a:solidFill>
-              </a:rPr>
-              <a:t>모델링</a:t>
-            </a:r>
-          </a:p>
-        </p:txBody>
-      </p:sp>
-      <p:sp>
-        <p:nvSpPr>
-          <p:cNvPr id="4" name="TextBox 3">
-            <a:extLst>
-              <a:ext uri="{FF2B5EF4-FFF2-40B4-BE49-F238E27FC236}">
-                <a16:creationId xmlns:a16="http://schemas.microsoft.com/office/drawing/2014/main" id="{6367E962-ACE8-D439-FF3B-EAF0CBFA1FC8}"/>
-              </a:ext>
-            </a:extLst>
-          </p:cNvPr>
-          <p:cNvSpPr txBox="1"/>
-          <p:nvPr/>
-        </p:nvSpPr>
-        <p:spPr>
-          <a:xfrm>
-            <a:off x="12636145" y="2286718"/>
-            <a:ext cx="2590801" cy="646331"/>
-          </a:xfrm>
-          <a:prstGeom prst="rect">
-            <a:avLst/>
-          </a:prstGeom>
-          <a:noFill/>
-        </p:spPr>
-        <p:txBody>
-          <a:bodyPr wrap="square" rtlCol="0">
-            <a:spAutoFit/>
-          </a:bodyPr>
-          <a:lstStyle/>
-          <a:p>
-            <a:r>
-              <a:rPr lang="ko-KR" altLang="en-US" sz="3600" dirty="0">
-                <a:solidFill>
-                  <a:srgbClr val="40514E"/>
-                </a:solidFill>
-              </a:rPr>
-              <a:t>자연어 처리</a:t>
-            </a:r>
-          </a:p>
-        </p:txBody>
-      </p:sp>
-      <p:pic>
-        <p:nvPicPr>
-          <p:cNvPr id="11" name="그림 10">
-            <a:extLst>
-              <a:ext uri="{FF2B5EF4-FFF2-40B4-BE49-F238E27FC236}">
-                <a16:creationId xmlns:a16="http://schemas.microsoft.com/office/drawing/2014/main" id="{312D159B-02B6-3DF4-F4AF-38FE52044800}"/>
-              </a:ext>
-            </a:extLst>
-          </p:cNvPr>
-          <p:cNvPicPr>
-            <a:picLocks noChangeAspect="1"/>
-          </p:cNvPicPr>
-          <p:nvPr/>
-        </p:nvPicPr>
-        <p:blipFill>
-          <a:blip r:embed="rId2"/>
-          <a:stretch>
-            <a:fillRect/>
-          </a:stretch>
-        </p:blipFill>
-        <p:spPr>
-          <a:xfrm>
-            <a:off x="1447800" y="4229100"/>
-            <a:ext cx="7513674" cy="4038600"/>
-          </a:xfrm>
-          <a:prstGeom prst="rect">
-            <a:avLst/>
-          </a:prstGeom>
-        </p:spPr>
-      </p:pic>
-      <p:pic>
-        <p:nvPicPr>
-          <p:cNvPr id="18" name="그림 17">
-            <a:extLst>
-              <a:ext uri="{FF2B5EF4-FFF2-40B4-BE49-F238E27FC236}">
-                <a16:creationId xmlns:a16="http://schemas.microsoft.com/office/drawing/2014/main" id="{13540798-F795-7DA3-2ED8-50249C8F20A8}"/>
-              </a:ext>
-            </a:extLst>
-          </p:cNvPr>
-          <p:cNvPicPr>
-            <a:picLocks noChangeAspect="1"/>
-          </p:cNvPicPr>
-          <p:nvPr/>
-        </p:nvPicPr>
-        <p:blipFill>
-          <a:blip r:embed="rId3"/>
-          <a:stretch>
-            <a:fillRect/>
-          </a:stretch>
-        </p:blipFill>
-        <p:spPr>
-          <a:xfrm>
-            <a:off x="10134600" y="6547739"/>
-            <a:ext cx="7848600" cy="572671"/>
-          </a:xfrm>
-          <a:prstGeom prst="rect">
-            <a:avLst/>
-          </a:prstGeom>
-        </p:spPr>
-      </p:pic>
-    </p:spTree>
-    <p:extLst>
-      <p:ext uri="{BB962C8B-B14F-4D97-AF65-F5344CB8AC3E}">
-        <p14:creationId xmlns:p14="http://schemas.microsoft.com/office/powerpoint/2010/main" val="3160113345"/>
-      </p:ext>
-    </p:extLst>
-  </p:cSld>
-  <p:clrMapOvr>
-    <a:masterClrMapping/>
-  </p:clrMapOvr>
-</p:sld>
-</file>
-
-<file path=ppt/slides/slide8.xml><?xml version="1.0" encoding="utf-8"?>
-<p:sld xmlns:a="http://schemas.openxmlformats.org/drawingml/2006/main" xmlns:r="http://schemas.openxmlformats.org/officeDocument/2006/relationships" xmlns:p="http://schemas.openxmlformats.org/presentationml/2006/main">
-  <p:cSld>
-    <p:spTree>
-      <p:nvGrpSpPr>
-        <p:cNvPr id="1" name=""/>
-        <p:cNvGrpSpPr/>
-        <p:nvPr/>
-      </p:nvGrpSpPr>
-      <p:grpSpPr>
-        <a:xfrm>
-          <a:off x="0" y="0"/>
-          <a:ext cx="0" cy="0"/>
-          <a:chOff x="0" y="0"/>
-          <a:chExt cx="0" cy="0"/>
-        </a:xfrm>
-      </p:grpSpPr>
-      <p:sp>
-        <p:nvSpPr>
           <p:cNvPr id="2" name="Object 2"/>
           <p:cNvSpPr txBox="1"/>
           <p:nvPr/>
@@ -7181,7 +7314,7 @@
                 <a:latin typeface="Bebas Neue" pitchFamily="34" charset="0"/>
                 <a:cs typeface="Bebas Neue" pitchFamily="34" charset="0"/>
               </a:rPr>
-              <a:t>04</a:t>
+              <a:t>03</a:t>
             </a:r>
             <a:endParaRPr lang="en-US" dirty="0"/>
           </a:p>
@@ -7189,10 +7322,10 @@
       </p:sp>
       <p:grpSp>
         <p:nvGrpSpPr>
-          <p:cNvPr id="8" name="그룹 7">
+          <p:cNvPr id="3" name="그룹 2">
             <a:extLst>
               <a:ext uri="{FF2B5EF4-FFF2-40B4-BE49-F238E27FC236}">
-                <a16:creationId xmlns:a16="http://schemas.microsoft.com/office/drawing/2014/main" id="{08306C3B-7E0A-AEBB-8A40-BCCBFA27307B}"/>
+                <a16:creationId xmlns:a16="http://schemas.microsoft.com/office/drawing/2014/main" id="{9A37B968-60DA-467B-300A-96C9349306E7}"/>
               </a:ext>
             </a:extLst>
           </p:cNvPr>
@@ -7201,48 +7334,68 @@
         </p:nvGrpSpPr>
         <p:grpSpPr>
           <a:xfrm>
-            <a:off x="409198" y="2324100"/>
-            <a:ext cx="17469604" cy="6832347"/>
-            <a:chOff x="409198" y="2324100"/>
-            <a:chExt cx="17469604" cy="6832347"/>
+            <a:off x="312388" y="2499283"/>
+            <a:ext cx="7396480" cy="5291498"/>
+            <a:chOff x="272798" y="589356"/>
+            <a:chExt cx="7396480" cy="5291498"/>
           </a:xfrm>
         </p:grpSpPr>
-        <p:pic>
-          <p:nvPicPr>
-            <p:cNvPr id="5" name="그림 4">
+        <p:sp>
+          <p:nvSpPr>
+            <p:cNvPr id="4" name="직사각형 3">
               <a:extLst>
                 <a:ext uri="{FF2B5EF4-FFF2-40B4-BE49-F238E27FC236}">
-                  <a16:creationId xmlns:a16="http://schemas.microsoft.com/office/drawing/2014/main" id="{26E1829B-C0EB-C19B-E389-663F159A0303}"/>
+                  <a16:creationId xmlns:a16="http://schemas.microsoft.com/office/drawing/2014/main" id="{E6F3A8DE-AC89-2D96-0A9D-55610E138109}"/>
                 </a:ext>
               </a:extLst>
             </p:cNvPr>
-            <p:cNvPicPr>
-              <a:picLocks noChangeAspect="1"/>
-            </p:cNvPicPr>
+            <p:cNvSpPr/>
             <p:nvPr/>
-          </p:nvPicPr>
-          <p:blipFill>
-            <a:blip r:embed="rId2"/>
-            <a:stretch>
-              <a:fillRect/>
-            </a:stretch>
-          </p:blipFill>
+          </p:nvSpPr>
           <p:spPr>
             <a:xfrm>
-              <a:off x="409198" y="2324100"/>
-              <a:ext cx="17469604" cy="6832347"/>
+              <a:off x="272798" y="589356"/>
+              <a:ext cx="7396480" cy="5291498"/>
             </a:xfrm>
             <a:prstGeom prst="rect">
               <a:avLst/>
             </a:prstGeom>
+            <a:solidFill>
+              <a:schemeClr val="accent3"/>
+            </a:solidFill>
+            <a:ln>
+              <a:noFill/>
+            </a:ln>
           </p:spPr>
-        </p:pic>
+          <p:style>
+            <a:lnRef idx="0">
+              <a:scrgbClr r="0" g="0" b="0"/>
+            </a:lnRef>
+            <a:fillRef idx="0">
+              <a:scrgbClr r="0" g="0" b="0"/>
+            </a:fillRef>
+            <a:effectRef idx="0">
+              <a:scrgbClr r="0" g="0" b="0"/>
+            </a:effectRef>
+            <a:fontRef idx="minor">
+              <a:schemeClr val="lt1"/>
+            </a:fontRef>
+          </p:style>
+          <p:txBody>
+            <a:bodyPr rtlCol="0" anchor="ctr"/>
+            <a:lstStyle/>
+            <a:p>
+              <a:pPr algn="ctr"/>
+              <a:endParaRPr lang="ko-KR" altLang="en-US" dirty="0"/>
+            </a:p>
+          </p:txBody>
+        </p:sp>
         <p:sp>
           <p:nvSpPr>
-            <p:cNvPr id="7" name="TextBox 6">
+            <p:cNvPr id="9" name="TextBox 8">
               <a:extLst>
                 <a:ext uri="{FF2B5EF4-FFF2-40B4-BE49-F238E27FC236}">
-                  <a16:creationId xmlns:a16="http://schemas.microsoft.com/office/drawing/2014/main" id="{4DD1289E-C482-4DCE-D71E-353777F6C9A1}"/>
+                  <a16:creationId xmlns:a16="http://schemas.microsoft.com/office/drawing/2014/main" id="{E0B4F7CA-C649-E174-A2A1-37816848A1BE}"/>
                 </a:ext>
               </a:extLst>
             </p:cNvPr>
@@ -7251,8 +7404,8 @@
           </p:nvSpPr>
           <p:spPr>
             <a:xfrm>
-              <a:off x="611957" y="2897970"/>
-              <a:ext cx="3886200" cy="369332"/>
+              <a:off x="2447038" y="977146"/>
+              <a:ext cx="3048000" cy="369332"/>
             </a:xfrm>
             <a:prstGeom prst="rect">
               <a:avLst/>
@@ -7265,27 +7418,371 @@
             </a:bodyPr>
             <a:lstStyle/>
             <a:p>
+              <a:pPr algn="ctr"/>
               <a:r>
-                <a:rPr lang="en-US" altLang="ko-KR" dirty="0">
-                  <a:latin typeface="맑은 고딕" panose="020B0503020000020004" pitchFamily="50" charset="-127"/>
-                  <a:ea typeface="맑은 고딕" panose="020B0503020000020004" pitchFamily="50" charset="-127"/>
-                </a:rPr>
-                <a:t>※ </a:t>
+                <a:rPr lang="ko-KR" altLang="en-US" dirty="0" err="1"/>
+                <a:t>홈화면</a:t>
+              </a:r>
+              <a:endParaRPr lang="en-US" altLang="ko-KR" dirty="0"/>
+            </a:p>
+          </p:txBody>
+        </p:sp>
+        <p:sp>
+          <p:nvSpPr>
+            <p:cNvPr id="11" name="TextBox 10">
+              <a:extLst>
+                <a:ext uri="{FF2B5EF4-FFF2-40B4-BE49-F238E27FC236}">
+                  <a16:creationId xmlns:a16="http://schemas.microsoft.com/office/drawing/2014/main" id="{52BBF281-F273-3CCE-A38D-2263551F56EB}"/>
+                </a:ext>
+              </a:extLst>
+            </p:cNvPr>
+            <p:cNvSpPr txBox="1"/>
+            <p:nvPr/>
+          </p:nvSpPr>
+          <p:spPr>
+            <a:xfrm>
+              <a:off x="557278" y="2259947"/>
+              <a:ext cx="3048000" cy="369332"/>
+            </a:xfrm>
+            <a:prstGeom prst="rect">
+              <a:avLst/>
+            </a:prstGeom>
+            <a:noFill/>
+          </p:spPr>
+          <p:txBody>
+            <a:bodyPr wrap="square" rtlCol="0">
+              <a:spAutoFit/>
+            </a:bodyPr>
+            <a:lstStyle/>
+            <a:p>
+              <a:pPr algn="ctr"/>
+              <a:r>
+                <a:rPr lang="ko-KR" altLang="en-US" dirty="0"/>
+                <a:t>제로 탄산 관련 짧은 글</a:t>
+              </a:r>
+              <a:endParaRPr lang="en-US" altLang="ko-KR" dirty="0"/>
+            </a:p>
+          </p:txBody>
+        </p:sp>
+        <p:sp>
+          <p:nvSpPr>
+            <p:cNvPr id="12" name="TextBox 11">
+              <a:extLst>
+                <a:ext uri="{FF2B5EF4-FFF2-40B4-BE49-F238E27FC236}">
+                  <a16:creationId xmlns:a16="http://schemas.microsoft.com/office/drawing/2014/main" id="{59FE1406-AA4A-DC13-40AE-CD5908915C3C}"/>
+                </a:ext>
+              </a:extLst>
+            </p:cNvPr>
+            <p:cNvSpPr txBox="1"/>
+            <p:nvPr/>
+          </p:nvSpPr>
+          <p:spPr>
+            <a:xfrm>
+              <a:off x="4194558" y="3151571"/>
+              <a:ext cx="3048000" cy="369332"/>
+            </a:xfrm>
+            <a:prstGeom prst="rect">
+              <a:avLst/>
+            </a:prstGeom>
+            <a:noFill/>
+          </p:spPr>
+          <p:txBody>
+            <a:bodyPr wrap="square" rtlCol="0">
+              <a:spAutoFit/>
+            </a:bodyPr>
+            <a:lstStyle/>
+            <a:p>
+              <a:pPr algn="ctr"/>
+              <a:r>
+                <a:rPr lang="ko-KR" altLang="en-US" dirty="0" err="1"/>
+                <a:t>제로탄산</a:t>
               </a:r>
               <a:r>
                 <a:rPr lang="ko-KR" altLang="en-US" dirty="0"/>
-                <a:t>예시</a:t>
+                <a:t> 음료 이미지</a:t>
               </a:r>
+              <a:endParaRPr lang="en-US" altLang="ko-KR" dirty="0"/>
             </a:p>
           </p:txBody>
         </p:sp>
+        <p:sp>
+          <p:nvSpPr>
+            <p:cNvPr id="13" name="TextBox 12">
+              <a:extLst>
+                <a:ext uri="{FF2B5EF4-FFF2-40B4-BE49-F238E27FC236}">
+                  <a16:creationId xmlns:a16="http://schemas.microsoft.com/office/drawing/2014/main" id="{F065E56B-FBE2-6D34-5F02-5772CF535830}"/>
+                </a:ext>
+              </a:extLst>
+            </p:cNvPr>
+            <p:cNvSpPr txBox="1"/>
+            <p:nvPr/>
+          </p:nvSpPr>
+          <p:spPr>
+            <a:xfrm>
+              <a:off x="461519" y="4559978"/>
+              <a:ext cx="3048000" cy="369332"/>
+            </a:xfrm>
+            <a:prstGeom prst="rect">
+              <a:avLst/>
+            </a:prstGeom>
+            <a:noFill/>
+          </p:spPr>
+          <p:txBody>
+            <a:bodyPr wrap="square" rtlCol="0">
+              <a:spAutoFit/>
+            </a:bodyPr>
+            <a:lstStyle/>
+            <a:p>
+              <a:pPr algn="ctr"/>
+              <a:r>
+                <a:rPr lang="ko-KR" altLang="en-US" dirty="0"/>
+                <a:t>구경하기 버튼</a:t>
+              </a:r>
+              <a:endParaRPr lang="en-US" altLang="ko-KR" dirty="0"/>
+            </a:p>
+          </p:txBody>
+        </p:sp>
+        <p:sp>
+          <p:nvSpPr>
+            <p:cNvPr id="16" name="직사각형 15">
+              <a:extLst>
+                <a:ext uri="{FF2B5EF4-FFF2-40B4-BE49-F238E27FC236}">
+                  <a16:creationId xmlns:a16="http://schemas.microsoft.com/office/drawing/2014/main" id="{F3A801B8-E805-A40F-A498-D37AF176C295}"/>
+                </a:ext>
+              </a:extLst>
+            </p:cNvPr>
+            <p:cNvSpPr/>
+            <p:nvPr/>
+          </p:nvSpPr>
+          <p:spPr>
+            <a:xfrm>
+              <a:off x="846838" y="4317924"/>
+              <a:ext cx="2302762" cy="853516"/>
+            </a:xfrm>
+            <a:prstGeom prst="rect">
+              <a:avLst/>
+            </a:prstGeom>
+            <a:noFill/>
+            <a:ln>
+              <a:solidFill>
+                <a:schemeClr val="tx1"/>
+              </a:solidFill>
+            </a:ln>
+          </p:spPr>
+          <p:style>
+            <a:lnRef idx="2">
+              <a:schemeClr val="accent1">
+                <a:shade val="50000"/>
+              </a:schemeClr>
+            </a:lnRef>
+            <a:fillRef idx="1">
+              <a:schemeClr val="accent1"/>
+            </a:fillRef>
+            <a:effectRef idx="0">
+              <a:schemeClr val="accent1"/>
+            </a:effectRef>
+            <a:fontRef idx="minor">
+              <a:schemeClr val="lt1"/>
+            </a:fontRef>
+          </p:style>
+          <p:txBody>
+            <a:bodyPr rtlCol="0" anchor="ctr"/>
+            <a:lstStyle/>
+            <a:p>
+              <a:pPr algn="ctr"/>
+              <a:endParaRPr lang="ko-KR" altLang="en-US"/>
+            </a:p>
+          </p:txBody>
+        </p:sp>
+        <p:sp>
+          <p:nvSpPr>
+            <p:cNvPr id="18" name="직사각형 17">
+              <a:extLst>
+                <a:ext uri="{FF2B5EF4-FFF2-40B4-BE49-F238E27FC236}">
+                  <a16:creationId xmlns:a16="http://schemas.microsoft.com/office/drawing/2014/main" id="{6DD96163-E280-6464-F37C-42B374F771BF}"/>
+                </a:ext>
+              </a:extLst>
+            </p:cNvPr>
+            <p:cNvSpPr/>
+            <p:nvPr/>
+          </p:nvSpPr>
+          <p:spPr>
+            <a:xfrm>
+              <a:off x="409197" y="1696720"/>
+              <a:ext cx="3257041" cy="1371600"/>
+            </a:xfrm>
+            <a:prstGeom prst="rect">
+              <a:avLst/>
+            </a:prstGeom>
+            <a:noFill/>
+            <a:ln>
+              <a:solidFill>
+                <a:schemeClr val="tx1"/>
+              </a:solidFill>
+            </a:ln>
+          </p:spPr>
+          <p:style>
+            <a:lnRef idx="2">
+              <a:schemeClr val="accent1">
+                <a:shade val="50000"/>
+              </a:schemeClr>
+            </a:lnRef>
+            <a:fillRef idx="1">
+              <a:schemeClr val="accent1"/>
+            </a:fillRef>
+            <a:effectRef idx="0">
+              <a:schemeClr val="accent1"/>
+            </a:effectRef>
+            <a:fontRef idx="minor">
+              <a:schemeClr val="lt1"/>
+            </a:fontRef>
+          </p:style>
+          <p:txBody>
+            <a:bodyPr rtlCol="0" anchor="ctr"/>
+            <a:lstStyle/>
+            <a:p>
+              <a:pPr algn="ctr"/>
+              <a:endParaRPr lang="ko-KR" altLang="en-US"/>
+            </a:p>
+          </p:txBody>
+        </p:sp>
+        <p:sp>
+          <p:nvSpPr>
+            <p:cNvPr id="19" name="직사각형 18">
+              <a:extLst>
+                <a:ext uri="{FF2B5EF4-FFF2-40B4-BE49-F238E27FC236}">
+                  <a16:creationId xmlns:a16="http://schemas.microsoft.com/office/drawing/2014/main" id="{8FA47BF9-7820-E81E-AD6C-89B6224404E8}"/>
+                </a:ext>
+              </a:extLst>
+            </p:cNvPr>
+            <p:cNvSpPr/>
+            <p:nvPr/>
+          </p:nvSpPr>
+          <p:spPr>
+            <a:xfrm>
+              <a:off x="3971038" y="1950720"/>
+              <a:ext cx="3323842" cy="3068320"/>
+            </a:xfrm>
+            <a:prstGeom prst="rect">
+              <a:avLst/>
+            </a:prstGeom>
+            <a:noFill/>
+            <a:ln>
+              <a:solidFill>
+                <a:schemeClr val="tx1"/>
+              </a:solidFill>
+            </a:ln>
+          </p:spPr>
+          <p:style>
+            <a:lnRef idx="2">
+              <a:schemeClr val="accent1">
+                <a:shade val="50000"/>
+              </a:schemeClr>
+            </a:lnRef>
+            <a:fillRef idx="1">
+              <a:schemeClr val="accent1"/>
+            </a:fillRef>
+            <a:effectRef idx="0">
+              <a:schemeClr val="accent1"/>
+            </a:effectRef>
+            <a:fontRef idx="minor">
+              <a:schemeClr val="lt1"/>
+            </a:fontRef>
+          </p:style>
+          <p:txBody>
+            <a:bodyPr rtlCol="0" anchor="ctr"/>
+            <a:lstStyle/>
+            <a:p>
+              <a:pPr algn="ctr"/>
+              <a:endParaRPr lang="ko-KR" altLang="en-US"/>
+            </a:p>
+          </p:txBody>
+        </p:sp>
+        <p:sp>
+          <p:nvSpPr>
+            <p:cNvPr id="22" name="TextBox 21">
+              <a:extLst>
+                <a:ext uri="{FF2B5EF4-FFF2-40B4-BE49-F238E27FC236}">
+                  <a16:creationId xmlns:a16="http://schemas.microsoft.com/office/drawing/2014/main" id="{1272D264-8522-C6D4-5B8B-81AA940B0B78}"/>
+                </a:ext>
+              </a:extLst>
+            </p:cNvPr>
+            <p:cNvSpPr txBox="1"/>
+            <p:nvPr/>
+          </p:nvSpPr>
+          <p:spPr>
+            <a:xfrm>
+              <a:off x="1146558" y="5261094"/>
+              <a:ext cx="3048000" cy="369332"/>
+            </a:xfrm>
+            <a:prstGeom prst="rect">
+              <a:avLst/>
+            </a:prstGeom>
+            <a:noFill/>
+          </p:spPr>
+          <p:txBody>
+            <a:bodyPr wrap="square" rtlCol="0">
+              <a:spAutoFit/>
+            </a:bodyPr>
+            <a:lstStyle/>
+            <a:p>
+              <a:pPr algn="ctr"/>
+              <a:r>
+                <a:rPr lang="ko-KR" altLang="en-US" dirty="0"/>
+                <a:t>제품 목록 페이지 이동</a:t>
+              </a:r>
+              <a:endParaRPr lang="en-US" altLang="ko-KR" dirty="0"/>
+            </a:p>
+          </p:txBody>
+        </p:sp>
+        <p:cxnSp>
+          <p:nvCxnSpPr>
+            <p:cNvPr id="25" name="연결선: 꺾임 24">
+              <a:extLst>
+                <a:ext uri="{FF2B5EF4-FFF2-40B4-BE49-F238E27FC236}">
+                  <a16:creationId xmlns:a16="http://schemas.microsoft.com/office/drawing/2014/main" id="{3425C9D9-C2DD-129B-F22E-937677742A1E}"/>
+                </a:ext>
+              </a:extLst>
+            </p:cNvPr>
+            <p:cNvCxnSpPr>
+              <a:endCxn id="22" idx="0"/>
+            </p:cNvCxnSpPr>
+            <p:nvPr/>
+          </p:nvCxnSpPr>
+          <p:spPr>
+            <a:xfrm rot="16200000" flipH="1">
+              <a:off x="2298516" y="4889051"/>
+              <a:ext cx="395385" cy="348699"/>
+            </a:xfrm>
+            <a:prstGeom prst="bentConnector3">
+              <a:avLst/>
+            </a:prstGeom>
+            <a:ln>
+              <a:tailEnd type="triangle"/>
+            </a:ln>
+          </p:spPr>
+          <p:style>
+            <a:lnRef idx="1">
+              <a:schemeClr val="accent1"/>
+            </a:lnRef>
+            <a:fillRef idx="0">
+              <a:schemeClr val="accent1"/>
+            </a:fillRef>
+            <a:effectRef idx="0">
+              <a:schemeClr val="accent1"/>
+            </a:effectRef>
+            <a:fontRef idx="minor">
+              <a:schemeClr val="tx1"/>
+            </a:fontRef>
+          </p:style>
+        </p:cxnSp>
       </p:grpSp>
       <p:grpSp>
         <p:nvGrpSpPr>
-          <p:cNvPr id="15" name="그룹 14">
+          <p:cNvPr id="26" name="그룹 25">
             <a:extLst>
               <a:ext uri="{FF2B5EF4-FFF2-40B4-BE49-F238E27FC236}">
-                <a16:creationId xmlns:a16="http://schemas.microsoft.com/office/drawing/2014/main" id="{4B535FC3-39E3-8FB3-7BF6-970DED38A0DC}"/>
+                <a16:creationId xmlns:a16="http://schemas.microsoft.com/office/drawing/2014/main" id="{5558925D-850C-8462-0EBC-915D7B546EDC}"/>
               </a:ext>
             </a:extLst>
           </p:cNvPr>
@@ -7294,18 +7791,1328 @@
         </p:nvGrpSpPr>
         <p:grpSpPr>
           <a:xfrm>
-            <a:off x="2286000" y="718770"/>
-            <a:ext cx="13206916" cy="10043005"/>
-            <a:chOff x="1676400" y="1610604"/>
-            <a:chExt cx="14268450" cy="10996263"/>
+            <a:off x="6784509" y="4550544"/>
+            <a:ext cx="7589249" cy="5291498"/>
+            <a:chOff x="299692" y="589356"/>
+            <a:chExt cx="7589249" cy="5291498"/>
           </a:xfrm>
         </p:grpSpPr>
+        <p:sp>
+          <p:nvSpPr>
+            <p:cNvPr id="27" name="직사각형 26">
+              <a:extLst>
+                <a:ext uri="{FF2B5EF4-FFF2-40B4-BE49-F238E27FC236}">
+                  <a16:creationId xmlns:a16="http://schemas.microsoft.com/office/drawing/2014/main" id="{39FBD91E-223F-D2FF-C7E6-B88C8DF0432C}"/>
+                </a:ext>
+              </a:extLst>
+            </p:cNvPr>
+            <p:cNvSpPr/>
+            <p:nvPr/>
+          </p:nvSpPr>
+          <p:spPr>
+            <a:xfrm>
+              <a:off x="299692" y="589356"/>
+              <a:ext cx="7589249" cy="5291498"/>
+            </a:xfrm>
+            <a:prstGeom prst="rect">
+              <a:avLst/>
+            </a:prstGeom>
+            <a:solidFill>
+              <a:schemeClr val="accent3"/>
+            </a:solidFill>
+            <a:ln>
+              <a:noFill/>
+            </a:ln>
+          </p:spPr>
+          <p:style>
+            <a:lnRef idx="0">
+              <a:scrgbClr r="0" g="0" b="0"/>
+            </a:lnRef>
+            <a:fillRef idx="0">
+              <a:scrgbClr r="0" g="0" b="0"/>
+            </a:fillRef>
+            <a:effectRef idx="0">
+              <a:scrgbClr r="0" g="0" b="0"/>
+            </a:effectRef>
+            <a:fontRef idx="minor">
+              <a:schemeClr val="lt1"/>
+            </a:fontRef>
+          </p:style>
+          <p:txBody>
+            <a:bodyPr rtlCol="0" anchor="ctr"/>
+            <a:lstStyle/>
+            <a:p>
+              <a:pPr algn="ctr"/>
+              <a:endParaRPr lang="ko-KR" altLang="en-US" dirty="0"/>
+            </a:p>
+          </p:txBody>
+        </p:sp>
+        <p:sp>
+          <p:nvSpPr>
+            <p:cNvPr id="28" name="TextBox 27">
+              <a:extLst>
+                <a:ext uri="{FF2B5EF4-FFF2-40B4-BE49-F238E27FC236}">
+                  <a16:creationId xmlns:a16="http://schemas.microsoft.com/office/drawing/2014/main" id="{7A1943F6-499F-0EC1-9A2B-2D80FF2405A4}"/>
+                </a:ext>
+              </a:extLst>
+            </p:cNvPr>
+            <p:cNvSpPr txBox="1"/>
+            <p:nvPr/>
+          </p:nvSpPr>
+          <p:spPr>
+            <a:xfrm>
+              <a:off x="2447038" y="977146"/>
+              <a:ext cx="3048000" cy="369332"/>
+            </a:xfrm>
+            <a:prstGeom prst="rect">
+              <a:avLst/>
+            </a:prstGeom>
+            <a:noFill/>
+          </p:spPr>
+          <p:txBody>
+            <a:bodyPr wrap="square" rtlCol="0">
+              <a:spAutoFit/>
+            </a:bodyPr>
+            <a:lstStyle/>
+            <a:p>
+              <a:pPr algn="ctr"/>
+              <a:r>
+                <a:rPr lang="ko-KR" altLang="en-US" dirty="0"/>
+                <a:t>제품 목록 페이지</a:t>
+              </a:r>
+              <a:endParaRPr lang="en-US" altLang="ko-KR" dirty="0"/>
+            </a:p>
+          </p:txBody>
+        </p:sp>
+        <p:sp>
+          <p:nvSpPr>
+            <p:cNvPr id="29" name="TextBox 28">
+              <a:extLst>
+                <a:ext uri="{FF2B5EF4-FFF2-40B4-BE49-F238E27FC236}">
+                  <a16:creationId xmlns:a16="http://schemas.microsoft.com/office/drawing/2014/main" id="{ECB7E17E-879B-B2F7-B825-E9F4F4664A21}"/>
+                </a:ext>
+              </a:extLst>
+            </p:cNvPr>
+            <p:cNvSpPr txBox="1"/>
+            <p:nvPr/>
+          </p:nvSpPr>
+          <p:spPr>
+            <a:xfrm>
+              <a:off x="709678" y="2788557"/>
+              <a:ext cx="1262557" cy="369332"/>
+            </a:xfrm>
+            <a:prstGeom prst="rect">
+              <a:avLst/>
+            </a:prstGeom>
+            <a:noFill/>
+          </p:spPr>
+          <p:txBody>
+            <a:bodyPr wrap="square" rtlCol="0">
+              <a:spAutoFit/>
+            </a:bodyPr>
+            <a:lstStyle/>
+            <a:p>
+              <a:pPr algn="ctr"/>
+              <a:r>
+                <a:rPr lang="ko-KR" altLang="en-US" dirty="0"/>
+                <a:t>제품 </a:t>
+              </a:r>
+              <a:r>
+                <a:rPr lang="en-US" altLang="ko-KR" dirty="0"/>
+                <a:t>1</a:t>
+              </a:r>
+            </a:p>
+          </p:txBody>
+        </p:sp>
+        <p:sp>
+          <p:nvSpPr>
+            <p:cNvPr id="30" name="직사각형 29">
+              <a:extLst>
+                <a:ext uri="{FF2B5EF4-FFF2-40B4-BE49-F238E27FC236}">
+                  <a16:creationId xmlns:a16="http://schemas.microsoft.com/office/drawing/2014/main" id="{68085C7C-40C9-7010-CD8E-71C56FB17E92}"/>
+                </a:ext>
+              </a:extLst>
+            </p:cNvPr>
+            <p:cNvSpPr/>
+            <p:nvPr/>
+          </p:nvSpPr>
+          <p:spPr>
+            <a:xfrm>
+              <a:off x="561597" y="2225330"/>
+              <a:ext cx="1527179" cy="1371600"/>
+            </a:xfrm>
+            <a:prstGeom prst="rect">
+              <a:avLst/>
+            </a:prstGeom>
+            <a:noFill/>
+            <a:ln>
+              <a:solidFill>
+                <a:schemeClr val="tx1"/>
+              </a:solidFill>
+            </a:ln>
+          </p:spPr>
+          <p:style>
+            <a:lnRef idx="2">
+              <a:schemeClr val="accent1">
+                <a:shade val="50000"/>
+              </a:schemeClr>
+            </a:lnRef>
+            <a:fillRef idx="1">
+              <a:schemeClr val="accent1"/>
+            </a:fillRef>
+            <a:effectRef idx="0">
+              <a:schemeClr val="accent1"/>
+            </a:effectRef>
+            <a:fontRef idx="minor">
+              <a:schemeClr val="lt1"/>
+            </a:fontRef>
+          </p:style>
+          <p:txBody>
+            <a:bodyPr rtlCol="0" anchor="ctr"/>
+            <a:lstStyle/>
+            <a:p>
+              <a:pPr algn="ctr"/>
+              <a:endParaRPr lang="ko-KR" altLang="en-US"/>
+            </a:p>
+          </p:txBody>
+        </p:sp>
+        <p:sp>
+          <p:nvSpPr>
+            <p:cNvPr id="31" name="TextBox 30">
+              <a:extLst>
+                <a:ext uri="{FF2B5EF4-FFF2-40B4-BE49-F238E27FC236}">
+                  <a16:creationId xmlns:a16="http://schemas.microsoft.com/office/drawing/2014/main" id="{6FEED21A-C5EB-362A-B2BC-28183BCCE2AF}"/>
+                </a:ext>
+              </a:extLst>
+            </p:cNvPr>
+            <p:cNvSpPr txBox="1"/>
+            <p:nvPr/>
+          </p:nvSpPr>
+          <p:spPr>
+            <a:xfrm>
+              <a:off x="2599438" y="2788557"/>
+              <a:ext cx="1262557" cy="369332"/>
+            </a:xfrm>
+            <a:prstGeom prst="rect">
+              <a:avLst/>
+            </a:prstGeom>
+            <a:noFill/>
+          </p:spPr>
+          <p:txBody>
+            <a:bodyPr wrap="square" rtlCol="0">
+              <a:spAutoFit/>
+            </a:bodyPr>
+            <a:lstStyle/>
+            <a:p>
+              <a:pPr algn="ctr"/>
+              <a:r>
+                <a:rPr lang="ko-KR" altLang="en-US" dirty="0"/>
+                <a:t>제품 </a:t>
+              </a:r>
+              <a:r>
+                <a:rPr lang="en-US" altLang="ko-KR" dirty="0"/>
+                <a:t>2</a:t>
+              </a:r>
+            </a:p>
+          </p:txBody>
+        </p:sp>
+        <p:sp>
+          <p:nvSpPr>
+            <p:cNvPr id="32" name="직사각형 31">
+              <a:extLst>
+                <a:ext uri="{FF2B5EF4-FFF2-40B4-BE49-F238E27FC236}">
+                  <a16:creationId xmlns:a16="http://schemas.microsoft.com/office/drawing/2014/main" id="{E185DBD2-CBC1-A2F8-3DAC-E5399FAB3C8F}"/>
+                </a:ext>
+              </a:extLst>
+            </p:cNvPr>
+            <p:cNvSpPr/>
+            <p:nvPr/>
+          </p:nvSpPr>
+          <p:spPr>
+            <a:xfrm>
+              <a:off x="2451357" y="2225330"/>
+              <a:ext cx="1527179" cy="1371600"/>
+            </a:xfrm>
+            <a:prstGeom prst="rect">
+              <a:avLst/>
+            </a:prstGeom>
+            <a:noFill/>
+            <a:ln>
+              <a:solidFill>
+                <a:schemeClr val="tx1"/>
+              </a:solidFill>
+            </a:ln>
+          </p:spPr>
+          <p:style>
+            <a:lnRef idx="2">
+              <a:schemeClr val="accent1">
+                <a:shade val="50000"/>
+              </a:schemeClr>
+            </a:lnRef>
+            <a:fillRef idx="1">
+              <a:schemeClr val="accent1"/>
+            </a:fillRef>
+            <a:effectRef idx="0">
+              <a:schemeClr val="accent1"/>
+            </a:effectRef>
+            <a:fontRef idx="minor">
+              <a:schemeClr val="lt1"/>
+            </a:fontRef>
+          </p:style>
+          <p:txBody>
+            <a:bodyPr rtlCol="0" anchor="ctr"/>
+            <a:lstStyle/>
+            <a:p>
+              <a:pPr algn="ctr"/>
+              <a:endParaRPr lang="ko-KR" altLang="en-US"/>
+            </a:p>
+          </p:txBody>
+        </p:sp>
+        <p:sp>
+          <p:nvSpPr>
+            <p:cNvPr id="33" name="TextBox 32">
+              <a:extLst>
+                <a:ext uri="{FF2B5EF4-FFF2-40B4-BE49-F238E27FC236}">
+                  <a16:creationId xmlns:a16="http://schemas.microsoft.com/office/drawing/2014/main" id="{D214D6E2-CE92-72AE-9747-D2EC3CDCEBA0}"/>
+                </a:ext>
+              </a:extLst>
+            </p:cNvPr>
+            <p:cNvSpPr txBox="1"/>
+            <p:nvPr/>
+          </p:nvSpPr>
+          <p:spPr>
+            <a:xfrm>
+              <a:off x="4385208" y="2788557"/>
+              <a:ext cx="1262557" cy="369332"/>
+            </a:xfrm>
+            <a:prstGeom prst="rect">
+              <a:avLst/>
+            </a:prstGeom>
+            <a:noFill/>
+          </p:spPr>
+          <p:txBody>
+            <a:bodyPr wrap="square" rtlCol="0">
+              <a:spAutoFit/>
+            </a:bodyPr>
+            <a:lstStyle/>
+            <a:p>
+              <a:pPr algn="ctr"/>
+              <a:r>
+                <a:rPr lang="ko-KR" altLang="en-US" dirty="0"/>
+                <a:t>제품 </a:t>
+              </a:r>
+              <a:r>
+                <a:rPr lang="en-US" altLang="ko-KR" dirty="0"/>
+                <a:t>3</a:t>
+              </a:r>
+            </a:p>
+          </p:txBody>
+        </p:sp>
+        <p:sp>
+          <p:nvSpPr>
+            <p:cNvPr id="34" name="직사각형 33">
+              <a:extLst>
+                <a:ext uri="{FF2B5EF4-FFF2-40B4-BE49-F238E27FC236}">
+                  <a16:creationId xmlns:a16="http://schemas.microsoft.com/office/drawing/2014/main" id="{B3420707-D274-3D4A-6FB4-507DFD1BB398}"/>
+                </a:ext>
+              </a:extLst>
+            </p:cNvPr>
+            <p:cNvSpPr/>
+            <p:nvPr/>
+          </p:nvSpPr>
+          <p:spPr>
+            <a:xfrm>
+              <a:off x="4237127" y="2225330"/>
+              <a:ext cx="1527179" cy="1371600"/>
+            </a:xfrm>
+            <a:prstGeom prst="rect">
+              <a:avLst/>
+            </a:prstGeom>
+            <a:noFill/>
+            <a:ln>
+              <a:solidFill>
+                <a:schemeClr val="tx1"/>
+              </a:solidFill>
+            </a:ln>
+          </p:spPr>
+          <p:style>
+            <a:lnRef idx="2">
+              <a:schemeClr val="accent1">
+                <a:shade val="50000"/>
+              </a:schemeClr>
+            </a:lnRef>
+            <a:fillRef idx="1">
+              <a:schemeClr val="accent1"/>
+            </a:fillRef>
+            <a:effectRef idx="0">
+              <a:schemeClr val="accent1"/>
+            </a:effectRef>
+            <a:fontRef idx="minor">
+              <a:schemeClr val="lt1"/>
+            </a:fontRef>
+          </p:style>
+          <p:txBody>
+            <a:bodyPr rtlCol="0" anchor="ctr"/>
+            <a:lstStyle/>
+            <a:p>
+              <a:pPr algn="ctr"/>
+              <a:endParaRPr lang="ko-KR" altLang="en-US"/>
+            </a:p>
+          </p:txBody>
+        </p:sp>
+        <p:sp>
+          <p:nvSpPr>
+            <p:cNvPr id="35" name="TextBox 34">
+              <a:extLst>
+                <a:ext uri="{FF2B5EF4-FFF2-40B4-BE49-F238E27FC236}">
+                  <a16:creationId xmlns:a16="http://schemas.microsoft.com/office/drawing/2014/main" id="{08082085-D15B-B316-4666-BC9B5C0E570C}"/>
+                </a:ext>
+              </a:extLst>
+            </p:cNvPr>
+            <p:cNvSpPr txBox="1"/>
+            <p:nvPr/>
+          </p:nvSpPr>
+          <p:spPr>
+            <a:xfrm>
+              <a:off x="6274968" y="2788557"/>
+              <a:ext cx="1262557" cy="369332"/>
+            </a:xfrm>
+            <a:prstGeom prst="rect">
+              <a:avLst/>
+            </a:prstGeom>
+            <a:noFill/>
+          </p:spPr>
+          <p:txBody>
+            <a:bodyPr wrap="square" rtlCol="0">
+              <a:spAutoFit/>
+            </a:bodyPr>
+            <a:lstStyle/>
+            <a:p>
+              <a:pPr algn="ctr"/>
+              <a:r>
+                <a:rPr lang="ko-KR" altLang="en-US" dirty="0"/>
+                <a:t>제품 </a:t>
+              </a:r>
+              <a:r>
+                <a:rPr lang="en-US" altLang="ko-KR" dirty="0"/>
+                <a:t>4</a:t>
+              </a:r>
+            </a:p>
+          </p:txBody>
+        </p:sp>
+        <p:sp>
+          <p:nvSpPr>
+            <p:cNvPr id="36" name="직사각형 35">
+              <a:extLst>
+                <a:ext uri="{FF2B5EF4-FFF2-40B4-BE49-F238E27FC236}">
+                  <a16:creationId xmlns:a16="http://schemas.microsoft.com/office/drawing/2014/main" id="{B4FC38EA-5E34-B114-59B9-449AA10865E2}"/>
+                </a:ext>
+              </a:extLst>
+            </p:cNvPr>
+            <p:cNvSpPr/>
+            <p:nvPr/>
+          </p:nvSpPr>
+          <p:spPr>
+            <a:xfrm>
+              <a:off x="6126887" y="2225330"/>
+              <a:ext cx="1527179" cy="1371600"/>
+            </a:xfrm>
+            <a:prstGeom prst="rect">
+              <a:avLst/>
+            </a:prstGeom>
+            <a:noFill/>
+            <a:ln>
+              <a:solidFill>
+                <a:schemeClr val="tx1"/>
+              </a:solidFill>
+            </a:ln>
+          </p:spPr>
+          <p:style>
+            <a:lnRef idx="2">
+              <a:schemeClr val="accent1">
+                <a:shade val="50000"/>
+              </a:schemeClr>
+            </a:lnRef>
+            <a:fillRef idx="1">
+              <a:schemeClr val="accent1"/>
+            </a:fillRef>
+            <a:effectRef idx="0">
+              <a:schemeClr val="accent1"/>
+            </a:effectRef>
+            <a:fontRef idx="minor">
+              <a:schemeClr val="lt1"/>
+            </a:fontRef>
+          </p:style>
+          <p:txBody>
+            <a:bodyPr rtlCol="0" anchor="ctr"/>
+            <a:lstStyle/>
+            <a:p>
+              <a:pPr algn="ctr"/>
+              <a:endParaRPr lang="ko-KR" altLang="en-US"/>
+            </a:p>
+          </p:txBody>
+        </p:sp>
+        <p:sp>
+          <p:nvSpPr>
+            <p:cNvPr id="37" name="TextBox 36">
+              <a:extLst>
+                <a:ext uri="{FF2B5EF4-FFF2-40B4-BE49-F238E27FC236}">
+                  <a16:creationId xmlns:a16="http://schemas.microsoft.com/office/drawing/2014/main" id="{807542DE-AD66-A2E1-DE6F-E7C2934E8E75}"/>
+                </a:ext>
+              </a:extLst>
+            </p:cNvPr>
+            <p:cNvSpPr txBox="1"/>
+            <p:nvPr/>
+          </p:nvSpPr>
+          <p:spPr>
+            <a:xfrm>
+              <a:off x="709678" y="4420134"/>
+              <a:ext cx="1262557" cy="369332"/>
+            </a:xfrm>
+            <a:prstGeom prst="rect">
+              <a:avLst/>
+            </a:prstGeom>
+            <a:noFill/>
+          </p:spPr>
+          <p:txBody>
+            <a:bodyPr wrap="square" rtlCol="0">
+              <a:spAutoFit/>
+            </a:bodyPr>
+            <a:lstStyle/>
+            <a:p>
+              <a:pPr algn="ctr"/>
+              <a:r>
+                <a:rPr lang="ko-KR" altLang="en-US" dirty="0"/>
+                <a:t>제품 </a:t>
+              </a:r>
+              <a:r>
+                <a:rPr lang="en-US" altLang="ko-KR" dirty="0"/>
+                <a:t>5</a:t>
+              </a:r>
+            </a:p>
+          </p:txBody>
+        </p:sp>
+        <p:sp>
+          <p:nvSpPr>
+            <p:cNvPr id="38" name="직사각형 37">
+              <a:extLst>
+                <a:ext uri="{FF2B5EF4-FFF2-40B4-BE49-F238E27FC236}">
+                  <a16:creationId xmlns:a16="http://schemas.microsoft.com/office/drawing/2014/main" id="{E1B624E1-59ED-1072-B020-445CBFA436D7}"/>
+                </a:ext>
+              </a:extLst>
+            </p:cNvPr>
+            <p:cNvSpPr/>
+            <p:nvPr/>
+          </p:nvSpPr>
+          <p:spPr>
+            <a:xfrm>
+              <a:off x="561597" y="3856907"/>
+              <a:ext cx="1527179" cy="1371600"/>
+            </a:xfrm>
+            <a:prstGeom prst="rect">
+              <a:avLst/>
+            </a:prstGeom>
+            <a:noFill/>
+            <a:ln>
+              <a:solidFill>
+                <a:schemeClr val="tx1"/>
+              </a:solidFill>
+            </a:ln>
+          </p:spPr>
+          <p:style>
+            <a:lnRef idx="2">
+              <a:schemeClr val="accent1">
+                <a:shade val="50000"/>
+              </a:schemeClr>
+            </a:lnRef>
+            <a:fillRef idx="1">
+              <a:schemeClr val="accent1"/>
+            </a:fillRef>
+            <a:effectRef idx="0">
+              <a:schemeClr val="accent1"/>
+            </a:effectRef>
+            <a:fontRef idx="minor">
+              <a:schemeClr val="lt1"/>
+            </a:fontRef>
+          </p:style>
+          <p:txBody>
+            <a:bodyPr rtlCol="0" anchor="ctr"/>
+            <a:lstStyle/>
+            <a:p>
+              <a:pPr algn="ctr"/>
+              <a:endParaRPr lang="ko-KR" altLang="en-US"/>
+            </a:p>
+          </p:txBody>
+        </p:sp>
+        <p:sp>
+          <p:nvSpPr>
+            <p:cNvPr id="39" name="TextBox 38">
+              <a:extLst>
+                <a:ext uri="{FF2B5EF4-FFF2-40B4-BE49-F238E27FC236}">
+                  <a16:creationId xmlns:a16="http://schemas.microsoft.com/office/drawing/2014/main" id="{3AB99794-DA30-41BC-2497-DAA9297D7E66}"/>
+                </a:ext>
+              </a:extLst>
+            </p:cNvPr>
+            <p:cNvSpPr txBox="1"/>
+            <p:nvPr/>
+          </p:nvSpPr>
+          <p:spPr>
+            <a:xfrm>
+              <a:off x="2599438" y="4420134"/>
+              <a:ext cx="1262557" cy="369332"/>
+            </a:xfrm>
+            <a:prstGeom prst="rect">
+              <a:avLst/>
+            </a:prstGeom>
+            <a:noFill/>
+          </p:spPr>
+          <p:txBody>
+            <a:bodyPr wrap="square" rtlCol="0">
+              <a:spAutoFit/>
+            </a:bodyPr>
+            <a:lstStyle/>
+            <a:p>
+              <a:pPr algn="ctr"/>
+              <a:r>
+                <a:rPr lang="ko-KR" altLang="en-US" dirty="0"/>
+                <a:t>제품 </a:t>
+              </a:r>
+              <a:r>
+                <a:rPr lang="en-US" altLang="ko-KR" dirty="0"/>
+                <a:t>6</a:t>
+              </a:r>
+            </a:p>
+          </p:txBody>
+        </p:sp>
+        <p:sp>
+          <p:nvSpPr>
+            <p:cNvPr id="40" name="직사각형 39">
+              <a:extLst>
+                <a:ext uri="{FF2B5EF4-FFF2-40B4-BE49-F238E27FC236}">
+                  <a16:creationId xmlns:a16="http://schemas.microsoft.com/office/drawing/2014/main" id="{F3C321D5-DF59-8BD1-D79E-77FA5CEAB428}"/>
+                </a:ext>
+              </a:extLst>
+            </p:cNvPr>
+            <p:cNvSpPr/>
+            <p:nvPr/>
+          </p:nvSpPr>
+          <p:spPr>
+            <a:xfrm>
+              <a:off x="2451357" y="3856907"/>
+              <a:ext cx="1527179" cy="1371600"/>
+            </a:xfrm>
+            <a:prstGeom prst="rect">
+              <a:avLst/>
+            </a:prstGeom>
+            <a:noFill/>
+            <a:ln>
+              <a:solidFill>
+                <a:schemeClr val="tx1"/>
+              </a:solidFill>
+            </a:ln>
+          </p:spPr>
+          <p:style>
+            <a:lnRef idx="2">
+              <a:schemeClr val="accent1">
+                <a:shade val="50000"/>
+              </a:schemeClr>
+            </a:lnRef>
+            <a:fillRef idx="1">
+              <a:schemeClr val="accent1"/>
+            </a:fillRef>
+            <a:effectRef idx="0">
+              <a:schemeClr val="accent1"/>
+            </a:effectRef>
+            <a:fontRef idx="minor">
+              <a:schemeClr val="lt1"/>
+            </a:fontRef>
+          </p:style>
+          <p:txBody>
+            <a:bodyPr rtlCol="0" anchor="ctr"/>
+            <a:lstStyle/>
+            <a:p>
+              <a:pPr algn="ctr"/>
+              <a:endParaRPr lang="ko-KR" altLang="en-US"/>
+            </a:p>
+          </p:txBody>
+        </p:sp>
+        <p:sp>
+          <p:nvSpPr>
+            <p:cNvPr id="41" name="TextBox 40">
+              <a:extLst>
+                <a:ext uri="{FF2B5EF4-FFF2-40B4-BE49-F238E27FC236}">
+                  <a16:creationId xmlns:a16="http://schemas.microsoft.com/office/drawing/2014/main" id="{5FACFC7A-2C36-CD59-5B62-C35CD0EA1550}"/>
+                </a:ext>
+              </a:extLst>
+            </p:cNvPr>
+            <p:cNvSpPr txBox="1"/>
+            <p:nvPr/>
+          </p:nvSpPr>
+          <p:spPr>
+            <a:xfrm>
+              <a:off x="4385208" y="4420134"/>
+              <a:ext cx="1262557" cy="369332"/>
+            </a:xfrm>
+            <a:prstGeom prst="rect">
+              <a:avLst/>
+            </a:prstGeom>
+            <a:noFill/>
+          </p:spPr>
+          <p:txBody>
+            <a:bodyPr wrap="square" rtlCol="0">
+              <a:spAutoFit/>
+            </a:bodyPr>
+            <a:lstStyle/>
+            <a:p>
+              <a:pPr algn="ctr"/>
+              <a:r>
+                <a:rPr lang="ko-KR" altLang="en-US" dirty="0"/>
+                <a:t>제품 </a:t>
+              </a:r>
+              <a:r>
+                <a:rPr lang="en-US" altLang="ko-KR" dirty="0"/>
+                <a:t>7</a:t>
+              </a:r>
+            </a:p>
+          </p:txBody>
+        </p:sp>
+        <p:sp>
+          <p:nvSpPr>
+            <p:cNvPr id="42" name="직사각형 41">
+              <a:extLst>
+                <a:ext uri="{FF2B5EF4-FFF2-40B4-BE49-F238E27FC236}">
+                  <a16:creationId xmlns:a16="http://schemas.microsoft.com/office/drawing/2014/main" id="{FCFD11E9-1E77-8CB5-5B8C-CAA8C0281E80}"/>
+                </a:ext>
+              </a:extLst>
+            </p:cNvPr>
+            <p:cNvSpPr/>
+            <p:nvPr/>
+          </p:nvSpPr>
+          <p:spPr>
+            <a:xfrm>
+              <a:off x="4237127" y="3856907"/>
+              <a:ext cx="1527179" cy="1371600"/>
+            </a:xfrm>
+            <a:prstGeom prst="rect">
+              <a:avLst/>
+            </a:prstGeom>
+            <a:noFill/>
+            <a:ln>
+              <a:solidFill>
+                <a:schemeClr val="tx1"/>
+              </a:solidFill>
+            </a:ln>
+          </p:spPr>
+          <p:style>
+            <a:lnRef idx="2">
+              <a:schemeClr val="accent1">
+                <a:shade val="50000"/>
+              </a:schemeClr>
+            </a:lnRef>
+            <a:fillRef idx="1">
+              <a:schemeClr val="accent1"/>
+            </a:fillRef>
+            <a:effectRef idx="0">
+              <a:schemeClr val="accent1"/>
+            </a:effectRef>
+            <a:fontRef idx="minor">
+              <a:schemeClr val="lt1"/>
+            </a:fontRef>
+          </p:style>
+          <p:txBody>
+            <a:bodyPr rtlCol="0" anchor="ctr"/>
+            <a:lstStyle/>
+            <a:p>
+              <a:pPr algn="ctr"/>
+              <a:endParaRPr lang="ko-KR" altLang="en-US"/>
+            </a:p>
+          </p:txBody>
+        </p:sp>
+        <p:sp>
+          <p:nvSpPr>
+            <p:cNvPr id="43" name="TextBox 42">
+              <a:extLst>
+                <a:ext uri="{FF2B5EF4-FFF2-40B4-BE49-F238E27FC236}">
+                  <a16:creationId xmlns:a16="http://schemas.microsoft.com/office/drawing/2014/main" id="{FA0A7298-EAA6-E75B-B376-8DEA9EB2C0B2}"/>
+                </a:ext>
+              </a:extLst>
+            </p:cNvPr>
+            <p:cNvSpPr txBox="1"/>
+            <p:nvPr/>
+          </p:nvSpPr>
+          <p:spPr>
+            <a:xfrm>
+              <a:off x="6274968" y="4420134"/>
+              <a:ext cx="1262557" cy="369332"/>
+            </a:xfrm>
+            <a:prstGeom prst="rect">
+              <a:avLst/>
+            </a:prstGeom>
+            <a:noFill/>
+          </p:spPr>
+          <p:txBody>
+            <a:bodyPr wrap="square" rtlCol="0">
+              <a:spAutoFit/>
+            </a:bodyPr>
+            <a:lstStyle/>
+            <a:p>
+              <a:pPr algn="ctr"/>
+              <a:r>
+                <a:rPr lang="ko-KR" altLang="en-US" dirty="0"/>
+                <a:t>제품 </a:t>
+              </a:r>
+              <a:r>
+                <a:rPr lang="en-US" altLang="ko-KR" dirty="0"/>
+                <a:t>8</a:t>
+              </a:r>
+            </a:p>
+          </p:txBody>
+        </p:sp>
+        <p:sp>
+          <p:nvSpPr>
+            <p:cNvPr id="44" name="직사각형 43">
+              <a:extLst>
+                <a:ext uri="{FF2B5EF4-FFF2-40B4-BE49-F238E27FC236}">
+                  <a16:creationId xmlns:a16="http://schemas.microsoft.com/office/drawing/2014/main" id="{A692522F-573B-1384-4622-89697C906033}"/>
+                </a:ext>
+              </a:extLst>
+            </p:cNvPr>
+            <p:cNvSpPr/>
+            <p:nvPr/>
+          </p:nvSpPr>
+          <p:spPr>
+            <a:xfrm>
+              <a:off x="6126887" y="3856907"/>
+              <a:ext cx="1527179" cy="1371600"/>
+            </a:xfrm>
+            <a:prstGeom prst="rect">
+              <a:avLst/>
+            </a:prstGeom>
+            <a:noFill/>
+            <a:ln>
+              <a:solidFill>
+                <a:schemeClr val="tx1"/>
+              </a:solidFill>
+            </a:ln>
+          </p:spPr>
+          <p:style>
+            <a:lnRef idx="2">
+              <a:schemeClr val="accent1">
+                <a:shade val="50000"/>
+              </a:schemeClr>
+            </a:lnRef>
+            <a:fillRef idx="1">
+              <a:schemeClr val="accent1"/>
+            </a:fillRef>
+            <a:effectRef idx="0">
+              <a:schemeClr val="accent1"/>
+            </a:effectRef>
+            <a:fontRef idx="minor">
+              <a:schemeClr val="lt1"/>
+            </a:fontRef>
+          </p:style>
+          <p:txBody>
+            <a:bodyPr rtlCol="0" anchor="ctr"/>
+            <a:lstStyle/>
+            <a:p>
+              <a:pPr algn="ctr"/>
+              <a:endParaRPr lang="ko-KR" altLang="en-US"/>
+            </a:p>
+          </p:txBody>
+        </p:sp>
+        <p:cxnSp>
+          <p:nvCxnSpPr>
+            <p:cNvPr id="45" name="연결선: 꺾임 44">
+              <a:extLst>
+                <a:ext uri="{FF2B5EF4-FFF2-40B4-BE49-F238E27FC236}">
+                  <a16:creationId xmlns:a16="http://schemas.microsoft.com/office/drawing/2014/main" id="{CC6B6EB2-38F7-660E-326C-1B64C8C2A65F}"/>
+                </a:ext>
+              </a:extLst>
+            </p:cNvPr>
+            <p:cNvCxnSpPr/>
+            <p:nvPr/>
+          </p:nvCxnSpPr>
+          <p:spPr>
+            <a:xfrm rot="5400000" flipH="1" flipV="1">
+              <a:off x="1255059" y="2088470"/>
+              <a:ext cx="519953" cy="340659"/>
+            </a:xfrm>
+            <a:prstGeom prst="bentConnector3">
+              <a:avLst/>
+            </a:prstGeom>
+            <a:ln>
+              <a:tailEnd type="triangle"/>
+            </a:ln>
+          </p:spPr>
+          <p:style>
+            <a:lnRef idx="1">
+              <a:schemeClr val="accent1"/>
+            </a:lnRef>
+            <a:fillRef idx="0">
+              <a:schemeClr val="accent1"/>
+            </a:fillRef>
+            <a:effectRef idx="0">
+              <a:schemeClr val="accent1"/>
+            </a:effectRef>
+            <a:fontRef idx="minor">
+              <a:schemeClr val="tx1"/>
+            </a:fontRef>
+          </p:style>
+        </p:cxnSp>
+        <p:sp>
+          <p:nvSpPr>
+            <p:cNvPr id="46" name="TextBox 45">
+              <a:extLst>
+                <a:ext uri="{FF2B5EF4-FFF2-40B4-BE49-F238E27FC236}">
+                  <a16:creationId xmlns:a16="http://schemas.microsoft.com/office/drawing/2014/main" id="{5F5D6923-80AA-3280-2527-62CC7534F288}"/>
+                </a:ext>
+              </a:extLst>
+            </p:cNvPr>
+            <p:cNvSpPr txBox="1"/>
+            <p:nvPr/>
+          </p:nvSpPr>
+          <p:spPr>
+            <a:xfrm>
+              <a:off x="561597" y="1574385"/>
+              <a:ext cx="3048000" cy="369332"/>
+            </a:xfrm>
+            <a:prstGeom prst="rect">
+              <a:avLst/>
+            </a:prstGeom>
+            <a:noFill/>
+          </p:spPr>
+          <p:txBody>
+            <a:bodyPr wrap="square" rtlCol="0">
+              <a:spAutoFit/>
+            </a:bodyPr>
+            <a:lstStyle/>
+            <a:p>
+              <a:pPr algn="ctr"/>
+              <a:r>
+                <a:rPr lang="ko-KR" altLang="en-US" dirty="0"/>
+                <a:t>제품 </a:t>
+              </a:r>
+              <a:r>
+                <a:rPr lang="en-US" altLang="ko-KR" dirty="0"/>
+                <a:t>info </a:t>
+              </a:r>
+              <a:r>
+                <a:rPr lang="ko-KR" altLang="en-US" dirty="0"/>
+                <a:t>페이지</a:t>
+              </a:r>
+              <a:endParaRPr lang="en-US" altLang="ko-KR" dirty="0"/>
+            </a:p>
+          </p:txBody>
+        </p:sp>
+      </p:grpSp>
+      <p:grpSp>
+        <p:nvGrpSpPr>
+          <p:cNvPr id="47" name="그룹 46">
+            <a:extLst>
+              <a:ext uri="{FF2B5EF4-FFF2-40B4-BE49-F238E27FC236}">
+                <a16:creationId xmlns:a16="http://schemas.microsoft.com/office/drawing/2014/main" id="{55B984CD-E9D2-72BF-E65D-FE9523280FC0}"/>
+              </a:ext>
+            </a:extLst>
+          </p:cNvPr>
+          <p:cNvGrpSpPr/>
+          <p:nvPr/>
+        </p:nvGrpSpPr>
+        <p:grpSpPr>
+          <a:xfrm>
+            <a:off x="8684090" y="754214"/>
+            <a:ext cx="8512614" cy="5291498"/>
+            <a:chOff x="299692" y="659868"/>
+            <a:chExt cx="8512614" cy="5291498"/>
+          </a:xfrm>
+        </p:grpSpPr>
+        <p:sp>
+          <p:nvSpPr>
+            <p:cNvPr id="48" name="직사각형 47">
+              <a:extLst>
+                <a:ext uri="{FF2B5EF4-FFF2-40B4-BE49-F238E27FC236}">
+                  <a16:creationId xmlns:a16="http://schemas.microsoft.com/office/drawing/2014/main" id="{524FF0FE-6CA3-09EF-999E-E4E8610E42C7}"/>
+                </a:ext>
+              </a:extLst>
+            </p:cNvPr>
+            <p:cNvSpPr/>
+            <p:nvPr/>
+          </p:nvSpPr>
+          <p:spPr>
+            <a:xfrm>
+              <a:off x="299692" y="659868"/>
+              <a:ext cx="8512614" cy="5291498"/>
+            </a:xfrm>
+            <a:prstGeom prst="rect">
+              <a:avLst/>
+            </a:prstGeom>
+            <a:solidFill>
+              <a:schemeClr val="accent3"/>
+            </a:solidFill>
+            <a:ln>
+              <a:noFill/>
+            </a:ln>
+          </p:spPr>
+          <p:style>
+            <a:lnRef idx="0">
+              <a:scrgbClr r="0" g="0" b="0"/>
+            </a:lnRef>
+            <a:fillRef idx="0">
+              <a:scrgbClr r="0" g="0" b="0"/>
+            </a:fillRef>
+            <a:effectRef idx="0">
+              <a:scrgbClr r="0" g="0" b="0"/>
+            </a:effectRef>
+            <a:fontRef idx="minor">
+              <a:schemeClr val="lt1"/>
+            </a:fontRef>
+          </p:style>
+          <p:txBody>
+            <a:bodyPr rtlCol="0" anchor="ctr"/>
+            <a:lstStyle/>
+            <a:p>
+              <a:pPr algn="ctr"/>
+              <a:endParaRPr lang="ko-KR" altLang="en-US" dirty="0"/>
+            </a:p>
+          </p:txBody>
+        </p:sp>
+        <p:sp>
+          <p:nvSpPr>
+            <p:cNvPr id="49" name="TextBox 48">
+              <a:extLst>
+                <a:ext uri="{FF2B5EF4-FFF2-40B4-BE49-F238E27FC236}">
+                  <a16:creationId xmlns:a16="http://schemas.microsoft.com/office/drawing/2014/main" id="{CD8182D1-F812-7C9F-E591-2B5409115962}"/>
+                </a:ext>
+              </a:extLst>
+            </p:cNvPr>
+            <p:cNvSpPr txBox="1"/>
+            <p:nvPr/>
+          </p:nvSpPr>
+          <p:spPr>
+            <a:xfrm>
+              <a:off x="2447038" y="977146"/>
+              <a:ext cx="3048000" cy="369332"/>
+            </a:xfrm>
+            <a:prstGeom prst="rect">
+              <a:avLst/>
+            </a:prstGeom>
+            <a:noFill/>
+          </p:spPr>
+          <p:txBody>
+            <a:bodyPr wrap="square" rtlCol="0">
+              <a:spAutoFit/>
+            </a:bodyPr>
+            <a:lstStyle/>
+            <a:p>
+              <a:pPr algn="ctr"/>
+              <a:r>
+                <a:rPr lang="ko-KR" altLang="en-US" dirty="0"/>
+                <a:t>제품 </a:t>
+              </a:r>
+              <a:r>
+                <a:rPr lang="en-US" altLang="ko-KR" dirty="0"/>
+                <a:t>info </a:t>
+              </a:r>
+              <a:r>
+                <a:rPr lang="ko-KR" altLang="en-US" dirty="0"/>
+                <a:t>페이지</a:t>
+              </a:r>
+              <a:endParaRPr lang="en-US" altLang="ko-KR" dirty="0"/>
+            </a:p>
+          </p:txBody>
+        </p:sp>
+        <p:sp>
+          <p:nvSpPr>
+            <p:cNvPr id="50" name="TextBox 49">
+              <a:extLst>
+                <a:ext uri="{FF2B5EF4-FFF2-40B4-BE49-F238E27FC236}">
+                  <a16:creationId xmlns:a16="http://schemas.microsoft.com/office/drawing/2014/main" id="{6B4D077E-5D4F-DA9C-6AD0-21CD0DA1843C}"/>
+                </a:ext>
+              </a:extLst>
+            </p:cNvPr>
+            <p:cNvSpPr txBox="1"/>
+            <p:nvPr/>
+          </p:nvSpPr>
+          <p:spPr>
+            <a:xfrm>
+              <a:off x="762256" y="2982452"/>
+              <a:ext cx="1914756" cy="646331"/>
+            </a:xfrm>
+            <a:prstGeom prst="rect">
+              <a:avLst/>
+            </a:prstGeom>
+            <a:noFill/>
+          </p:spPr>
+          <p:txBody>
+            <a:bodyPr wrap="square" rtlCol="0">
+              <a:spAutoFit/>
+            </a:bodyPr>
+            <a:lstStyle/>
+            <a:p>
+              <a:pPr algn="ctr"/>
+              <a:r>
+                <a:rPr lang="ko-KR" altLang="en-US" dirty="0"/>
+                <a:t>제품 </a:t>
+              </a:r>
+              <a:r>
+                <a:rPr lang="en-US" altLang="ko-KR" dirty="0"/>
+                <a:t>1</a:t>
+              </a:r>
+            </a:p>
+            <a:p>
+              <a:pPr algn="ctr"/>
+              <a:r>
+                <a:rPr lang="ko-KR" altLang="en-US" dirty="0"/>
+                <a:t>이미지</a:t>
+              </a:r>
+              <a:endParaRPr lang="en-US" altLang="ko-KR" dirty="0"/>
+            </a:p>
+          </p:txBody>
+        </p:sp>
+        <p:sp>
+          <p:nvSpPr>
+            <p:cNvPr id="51" name="직사각형 50">
+              <a:extLst>
+                <a:ext uri="{FF2B5EF4-FFF2-40B4-BE49-F238E27FC236}">
+                  <a16:creationId xmlns:a16="http://schemas.microsoft.com/office/drawing/2014/main" id="{5A796CAD-69D1-D4BD-ED2A-B1028D77DBB8}"/>
+                </a:ext>
+              </a:extLst>
+            </p:cNvPr>
+            <p:cNvSpPr/>
+            <p:nvPr/>
+          </p:nvSpPr>
+          <p:spPr>
+            <a:xfrm>
+              <a:off x="561597" y="2225330"/>
+              <a:ext cx="2316074" cy="1943258"/>
+            </a:xfrm>
+            <a:prstGeom prst="rect">
+              <a:avLst/>
+            </a:prstGeom>
+            <a:noFill/>
+            <a:ln>
+              <a:solidFill>
+                <a:schemeClr val="tx1"/>
+              </a:solidFill>
+            </a:ln>
+          </p:spPr>
+          <p:style>
+            <a:lnRef idx="2">
+              <a:schemeClr val="accent1">
+                <a:shade val="50000"/>
+              </a:schemeClr>
+            </a:lnRef>
+            <a:fillRef idx="1">
+              <a:schemeClr val="accent1"/>
+            </a:fillRef>
+            <a:effectRef idx="0">
+              <a:schemeClr val="accent1"/>
+            </a:effectRef>
+            <a:fontRef idx="minor">
+              <a:schemeClr val="lt1"/>
+            </a:fontRef>
+          </p:style>
+          <p:txBody>
+            <a:bodyPr rtlCol="0" anchor="ctr"/>
+            <a:lstStyle/>
+            <a:p>
+              <a:pPr algn="ctr"/>
+              <a:endParaRPr lang="ko-KR" altLang="en-US"/>
+            </a:p>
+          </p:txBody>
+        </p:sp>
+        <p:sp>
+          <p:nvSpPr>
+            <p:cNvPr id="52" name="TextBox 51">
+              <a:extLst>
+                <a:ext uri="{FF2B5EF4-FFF2-40B4-BE49-F238E27FC236}">
+                  <a16:creationId xmlns:a16="http://schemas.microsoft.com/office/drawing/2014/main" id="{78BF01E5-C8B0-2251-72A1-F2E3CB93632D}"/>
+                </a:ext>
+              </a:extLst>
+            </p:cNvPr>
+            <p:cNvSpPr txBox="1"/>
+            <p:nvPr/>
+          </p:nvSpPr>
+          <p:spPr>
+            <a:xfrm>
+              <a:off x="654680" y="4488523"/>
+              <a:ext cx="1914756" cy="646331"/>
+            </a:xfrm>
+            <a:prstGeom prst="rect">
+              <a:avLst/>
+            </a:prstGeom>
+            <a:noFill/>
+          </p:spPr>
+          <p:txBody>
+            <a:bodyPr wrap="square" rtlCol="0">
+              <a:spAutoFit/>
+            </a:bodyPr>
+            <a:lstStyle/>
+            <a:p>
+              <a:pPr algn="ctr"/>
+              <a:r>
+                <a:rPr lang="ko-KR" altLang="en-US" dirty="0"/>
+                <a:t>제품 </a:t>
+              </a:r>
+              <a:r>
+                <a:rPr lang="en-US" altLang="ko-KR" dirty="0"/>
+                <a:t>1</a:t>
+              </a:r>
+            </a:p>
+            <a:p>
+              <a:pPr algn="ctr"/>
+              <a:r>
+                <a:rPr lang="ko-KR" altLang="en-US" dirty="0" err="1"/>
+                <a:t>설명글</a:t>
+              </a:r>
+              <a:endParaRPr lang="en-US" altLang="ko-KR" dirty="0"/>
+            </a:p>
+          </p:txBody>
+        </p:sp>
+        <p:sp>
+          <p:nvSpPr>
+            <p:cNvPr id="53" name="TextBox 52">
+              <a:extLst>
+                <a:ext uri="{FF2B5EF4-FFF2-40B4-BE49-F238E27FC236}">
+                  <a16:creationId xmlns:a16="http://schemas.microsoft.com/office/drawing/2014/main" id="{30AA5B59-99BE-1331-22BB-0F442A04E9DA}"/>
+                </a:ext>
+              </a:extLst>
+            </p:cNvPr>
+            <p:cNvSpPr txBox="1"/>
+            <p:nvPr/>
+          </p:nvSpPr>
+          <p:spPr>
+            <a:xfrm>
+              <a:off x="3218586" y="2471464"/>
+              <a:ext cx="1914756" cy="1754326"/>
+            </a:xfrm>
+            <a:prstGeom prst="rect">
+              <a:avLst/>
+            </a:prstGeom>
+            <a:noFill/>
+          </p:spPr>
+          <p:txBody>
+            <a:bodyPr wrap="square" rtlCol="0">
+              <a:spAutoFit/>
+            </a:bodyPr>
+            <a:lstStyle/>
+            <a:p>
+              <a:pPr algn="ctr"/>
+              <a:r>
+                <a:rPr lang="ko-KR" altLang="en-US" dirty="0"/>
+                <a:t>제품 </a:t>
+              </a:r>
+              <a:r>
+                <a:rPr lang="en-US" altLang="ko-KR" dirty="0"/>
+                <a:t>1</a:t>
+              </a:r>
+            </a:p>
+            <a:p>
+              <a:pPr algn="ctr"/>
+              <a:r>
+                <a:rPr lang="ko-KR" altLang="en-US" dirty="0"/>
+                <a:t>상품 정보 </a:t>
+              </a:r>
+              <a:endParaRPr lang="en-US" altLang="ko-KR" dirty="0"/>
+            </a:p>
+            <a:p>
+              <a:pPr algn="ctr"/>
+              <a:r>
+                <a:rPr lang="en-US" altLang="ko-KR" dirty="0"/>
+                <a:t>Ex. </a:t>
+              </a:r>
+              <a:r>
+                <a:rPr lang="ko-KR" altLang="en-US" dirty="0"/>
+                <a:t>제품이름</a:t>
+              </a:r>
+              <a:r>
+                <a:rPr lang="en-US" altLang="ko-KR" dirty="0"/>
+                <a:t>, </a:t>
+              </a:r>
+            </a:p>
+            <a:p>
+              <a:pPr algn="ctr"/>
+              <a:r>
+                <a:rPr lang="ko-KR" altLang="en-US" dirty="0"/>
+                <a:t>가격</a:t>
+              </a:r>
+              <a:r>
+                <a:rPr lang="en-US" altLang="ko-KR" dirty="0"/>
+                <a:t> </a:t>
+              </a:r>
+              <a:r>
+                <a:rPr lang="ko-KR" altLang="en-US" dirty="0"/>
+                <a:t>등</a:t>
+              </a:r>
+              <a:endParaRPr lang="en-US" altLang="ko-KR" dirty="0"/>
+            </a:p>
+            <a:p>
+              <a:pPr algn="ctr"/>
+              <a:endParaRPr lang="en-US" altLang="ko-KR" dirty="0"/>
+            </a:p>
+            <a:p>
+              <a:pPr algn="ctr"/>
+              <a:endParaRPr lang="en-US" altLang="ko-KR" dirty="0"/>
+            </a:p>
+          </p:txBody>
+        </p:sp>
+        <p:sp>
+          <p:nvSpPr>
+            <p:cNvPr id="54" name="직사각형 53">
+              <a:extLst>
+                <a:ext uri="{FF2B5EF4-FFF2-40B4-BE49-F238E27FC236}">
+                  <a16:creationId xmlns:a16="http://schemas.microsoft.com/office/drawing/2014/main" id="{3FB2C4E2-572C-2426-8A16-4AEA5D140485}"/>
+                </a:ext>
+              </a:extLst>
+            </p:cNvPr>
+            <p:cNvSpPr/>
+            <p:nvPr/>
+          </p:nvSpPr>
+          <p:spPr>
+            <a:xfrm>
+              <a:off x="3017927" y="2225329"/>
+              <a:ext cx="2316074" cy="3117635"/>
+            </a:xfrm>
+            <a:prstGeom prst="rect">
+              <a:avLst/>
+            </a:prstGeom>
+            <a:noFill/>
+            <a:ln>
+              <a:solidFill>
+                <a:schemeClr val="tx1"/>
+              </a:solidFill>
+            </a:ln>
+          </p:spPr>
+          <p:style>
+            <a:lnRef idx="2">
+              <a:schemeClr val="accent1">
+                <a:shade val="50000"/>
+              </a:schemeClr>
+            </a:lnRef>
+            <a:fillRef idx="1">
+              <a:schemeClr val="accent1"/>
+            </a:fillRef>
+            <a:effectRef idx="0">
+              <a:schemeClr val="accent1"/>
+            </a:effectRef>
+            <a:fontRef idx="minor">
+              <a:schemeClr val="lt1"/>
+            </a:fontRef>
+          </p:style>
+          <p:txBody>
+            <a:bodyPr rtlCol="0" anchor="ctr"/>
+            <a:lstStyle/>
+            <a:p>
+              <a:pPr algn="ctr"/>
+              <a:endParaRPr lang="ko-KR" altLang="en-US"/>
+            </a:p>
+          </p:txBody>
+        </p:sp>
         <p:pic>
           <p:nvPicPr>
-            <p:cNvPr id="10" name="그림 9">
+            <p:cNvPr id="55" name="그림 54">
               <a:extLst>
                 <a:ext uri="{FF2B5EF4-FFF2-40B4-BE49-F238E27FC236}">
-                  <a16:creationId xmlns:a16="http://schemas.microsoft.com/office/drawing/2014/main" id="{486E7BF5-FBFD-8CCA-1EA6-25C113C476E9}"/>
+                  <a16:creationId xmlns:a16="http://schemas.microsoft.com/office/drawing/2014/main" id="{97C705D1-5B62-8F55-10C7-75D4673336B1}"/>
                 </a:ext>
               </a:extLst>
             </p:cNvPr>
@@ -7322,170 +9129,8 @@
           </p:blipFill>
           <p:spPr>
             <a:xfrm>
-              <a:off x="1676400" y="1610604"/>
-              <a:ext cx="14268450" cy="5286375"/>
-            </a:xfrm>
-            <a:prstGeom prst="rect">
-              <a:avLst/>
-            </a:prstGeom>
-          </p:spPr>
-        </p:pic>
-        <p:pic>
-          <p:nvPicPr>
-            <p:cNvPr id="14" name="그림 13">
-              <a:extLst>
-                <a:ext uri="{FF2B5EF4-FFF2-40B4-BE49-F238E27FC236}">
-                  <a16:creationId xmlns:a16="http://schemas.microsoft.com/office/drawing/2014/main" id="{377DD794-ABDA-C3C9-D9B1-B7758ED557D4}"/>
-                </a:ext>
-              </a:extLst>
-            </p:cNvPr>
-            <p:cNvPicPr>
-              <a:picLocks noChangeAspect="1"/>
-            </p:cNvPicPr>
-            <p:nvPr/>
-          </p:nvPicPr>
-          <p:blipFill>
-            <a:blip r:embed="rId4"/>
-            <a:stretch>
-              <a:fillRect/>
-            </a:stretch>
-          </p:blipFill>
-          <p:spPr>
-            <a:xfrm>
-              <a:off x="1676400" y="6853767"/>
-              <a:ext cx="14268450" cy="5753100"/>
-            </a:xfrm>
-            <a:prstGeom prst="rect">
-              <a:avLst/>
-            </a:prstGeom>
-          </p:spPr>
-        </p:pic>
-      </p:grpSp>
-      <p:grpSp>
-        <p:nvGrpSpPr>
-          <p:cNvPr id="24" name="그룹 23">
-            <a:extLst>
-              <a:ext uri="{FF2B5EF4-FFF2-40B4-BE49-F238E27FC236}">
-                <a16:creationId xmlns:a16="http://schemas.microsoft.com/office/drawing/2014/main" id="{EA7FFF28-6575-7536-15D5-05A6FCBF357A}"/>
-              </a:ext>
-            </a:extLst>
-          </p:cNvPr>
-          <p:cNvGrpSpPr/>
-          <p:nvPr/>
-        </p:nvGrpSpPr>
-        <p:grpSpPr>
-          <a:xfrm>
-            <a:off x="2808939" y="1610604"/>
-            <a:ext cx="12496800" cy="7112369"/>
-            <a:chOff x="3714889" y="1130553"/>
-            <a:chExt cx="10991711" cy="5724525"/>
-          </a:xfrm>
-        </p:grpSpPr>
-        <p:grpSp>
-          <p:nvGrpSpPr>
-            <p:cNvPr id="21" name="그룹 20">
-              <a:extLst>
-                <a:ext uri="{FF2B5EF4-FFF2-40B4-BE49-F238E27FC236}">
-                  <a16:creationId xmlns:a16="http://schemas.microsoft.com/office/drawing/2014/main" id="{2F75DFA1-B018-61DB-314B-317C70553AA8}"/>
-                </a:ext>
-              </a:extLst>
-            </p:cNvPr>
-            <p:cNvGrpSpPr/>
-            <p:nvPr/>
-          </p:nvGrpSpPr>
-          <p:grpSpPr>
-            <a:xfrm>
-              <a:off x="3714889" y="1130553"/>
-              <a:ext cx="10991711" cy="5724525"/>
-              <a:chOff x="3714889" y="1130553"/>
-              <a:chExt cx="10991711" cy="5724525"/>
-            </a:xfrm>
-          </p:grpSpPr>
-          <p:pic>
-            <p:nvPicPr>
-              <p:cNvPr id="17" name="그림 16">
-                <a:extLst>
-                  <a:ext uri="{FF2B5EF4-FFF2-40B4-BE49-F238E27FC236}">
-                    <a16:creationId xmlns:a16="http://schemas.microsoft.com/office/drawing/2014/main" id="{A5160D5F-7E54-61DD-FC75-0846AAF9238E}"/>
-                  </a:ext>
-                </a:extLst>
-              </p:cNvPr>
-              <p:cNvPicPr>
-                <a:picLocks noChangeAspect="1"/>
-              </p:cNvPicPr>
-              <p:nvPr/>
-            </p:nvPicPr>
-            <p:blipFill>
-              <a:blip r:embed="rId5"/>
-              <a:stretch>
-                <a:fillRect/>
-              </a:stretch>
-            </p:blipFill>
-            <p:spPr>
-              <a:xfrm>
-                <a:off x="3714889" y="1130553"/>
-                <a:ext cx="6181725" cy="5724525"/>
-              </a:xfrm>
-              <a:prstGeom prst="rect">
-                <a:avLst/>
-              </a:prstGeom>
-            </p:spPr>
-          </p:pic>
-          <p:pic>
-            <p:nvPicPr>
-              <p:cNvPr id="20" name="그림 19">
-                <a:extLst>
-                  <a:ext uri="{FF2B5EF4-FFF2-40B4-BE49-F238E27FC236}">
-                    <a16:creationId xmlns:a16="http://schemas.microsoft.com/office/drawing/2014/main" id="{8BDBA4BD-BD36-872F-ED64-27E40DC54C88}"/>
-                  </a:ext>
-                </a:extLst>
-              </p:cNvPr>
-              <p:cNvPicPr>
-                <a:picLocks noChangeAspect="1"/>
-              </p:cNvPicPr>
-              <p:nvPr/>
-            </p:nvPicPr>
-            <p:blipFill>
-              <a:blip r:embed="rId6"/>
-              <a:stretch>
-                <a:fillRect/>
-              </a:stretch>
-            </p:blipFill>
-            <p:spPr>
-              <a:xfrm>
-                <a:off x="9896614" y="1130553"/>
-                <a:ext cx="4809986" cy="5724525"/>
-              </a:xfrm>
-              <a:prstGeom prst="rect">
-                <a:avLst/>
-              </a:prstGeom>
-            </p:spPr>
-          </p:pic>
-        </p:grpSp>
-        <p:pic>
-          <p:nvPicPr>
-            <p:cNvPr id="23" name="그림 22">
-              <a:extLst>
-                <a:ext uri="{FF2B5EF4-FFF2-40B4-BE49-F238E27FC236}">
-                  <a16:creationId xmlns:a16="http://schemas.microsoft.com/office/drawing/2014/main" id="{0B98054A-1080-E3A0-113F-C05FE9515BBA}"/>
-                </a:ext>
-              </a:extLst>
-            </p:cNvPr>
-            <p:cNvPicPr>
-              <a:picLocks noChangeAspect="1"/>
-            </p:cNvPicPr>
-            <p:nvPr/>
-          </p:nvPicPr>
-          <p:blipFill>
-            <a:blip r:embed="rId7"/>
-            <a:stretch>
-              <a:fillRect/>
-            </a:stretch>
-          </p:blipFill>
-          <p:spPr>
-            <a:xfrm>
-              <a:off x="10225157" y="2171154"/>
-              <a:ext cx="4152900" cy="3571875"/>
+              <a:off x="5534660" y="2176298"/>
+              <a:ext cx="3147703" cy="2958556"/>
             </a:xfrm>
             <a:prstGeom prst="rect">
               <a:avLst/>
@@ -7537,7 +9182,7 @@
                                           </p:stCondLst>
                                         </p:cTn>
                                         <p:tgtEl>
-                                          <p:spTgt spid="15"/>
+                                          <p:spTgt spid="3"/>
                                         </p:tgtEl>
                                         <p:attrNameLst>
                                           <p:attrName>style.visibility</p:attrName>
@@ -7582,7 +9227,52 @@
                                           </p:stCondLst>
                                         </p:cTn>
                                         <p:tgtEl>
-                                          <p:spTgt spid="24"/>
+                                          <p:spTgt spid="26"/>
+                                        </p:tgtEl>
+                                        <p:attrNameLst>
+                                          <p:attrName>style.visibility</p:attrName>
+                                        </p:attrNameLst>
+                                      </p:cBhvr>
+                                      <p:to>
+                                        <p:strVal val="visible"/>
+                                      </p:to>
+                                    </p:set>
+                                  </p:childTnLst>
+                                </p:cTn>
+                              </p:par>
+                            </p:childTnLst>
+                          </p:cTn>
+                        </p:par>
+                      </p:childTnLst>
+                    </p:cTn>
+                  </p:par>
+                  <p:par>
+                    <p:cTn id="11" fill="hold">
+                      <p:stCondLst>
+                        <p:cond delay="indefinite"/>
+                      </p:stCondLst>
+                      <p:childTnLst>
+                        <p:par>
+                          <p:cTn id="12" fill="hold">
+                            <p:stCondLst>
+                              <p:cond delay="0"/>
+                            </p:stCondLst>
+                            <p:childTnLst>
+                              <p:par>
+                                <p:cTn id="13" presetID="1" presetClass="entr" presetSubtype="0" fill="hold" nodeType="clickEffect">
+                                  <p:stCondLst>
+                                    <p:cond delay="0"/>
+                                  </p:stCondLst>
+                                  <p:childTnLst>
+                                    <p:set>
+                                      <p:cBhvr>
+                                        <p:cTn id="14" dur="1" fill="hold">
+                                          <p:stCondLst>
+                                            <p:cond delay="0"/>
+                                          </p:stCondLst>
+                                        </p:cTn>
+                                        <p:tgtEl>
+                                          <p:spTgt spid="47"/>
                                         </p:tgtEl>
                                         <p:attrNameLst>
                                           <p:attrName>style.visibility</p:attrName>
@@ -7626,7 +9316,7 @@
 </p:sld>
 </file>
 
-<file path=ppt/slides/slide9.xml><?xml version="1.0" encoding="utf-8"?>
+<file path=ppt/slides/slide8.xml><?xml version="1.0" encoding="utf-8"?>
 <p:sld xmlns:a="http://schemas.openxmlformats.org/drawingml/2006/main" xmlns:r="http://schemas.openxmlformats.org/officeDocument/2006/relationships" xmlns:p="http://schemas.openxmlformats.org/presentationml/2006/main">
   <p:cSld name="Slide 5">
     <p:bg>
@@ -7674,7 +9364,7 @@
             <p:nvPr/>
           </p:nvPicPr>
           <p:blipFill>
-            <a:blip r:embed="rId2" cstate="print"/>
+            <a:blip r:embed="rId3" cstate="print"/>
             <a:stretch>
               <a:fillRect/>
             </a:stretch>
@@ -7750,7 +9440,7 @@
             <p:nvPr/>
           </p:nvPicPr>
           <p:blipFill>
-            <a:blip r:embed="rId3" cstate="print"/>
+            <a:blip r:embed="rId4" cstate="print"/>
             <a:stretch>
               <a:fillRect/>
             </a:stretch>
@@ -7826,7 +9516,7 @@
             <p:nvPr/>
           </p:nvPicPr>
           <p:blipFill>
-            <a:blip r:embed="rId4" cstate="print"/>
+            <a:blip r:embed="rId5" cstate="print"/>
             <a:stretch>
               <a:fillRect/>
             </a:stretch>
@@ -7902,7 +9592,7 @@
             <p:nvPr/>
           </p:nvPicPr>
           <p:blipFill>
-            <a:blip r:embed="rId5" cstate="print"/>
+            <a:blip r:embed="rId6" cstate="print"/>
             <a:stretch>
               <a:fillRect/>
             </a:stretch>
@@ -7941,7 +9631,7 @@
             <p:nvPr/>
           </p:nvPicPr>
           <p:blipFill>
-            <a:blip r:embed="rId6" cstate="print"/>
+            <a:blip r:embed="rId7" cstate="print"/>
             <a:stretch>
               <a:fillRect/>
             </a:stretch>
@@ -7980,7 +9670,7 @@
             <p:nvPr/>
           </p:nvPicPr>
           <p:blipFill>
-            <a:blip r:embed="rId6" cstate="print"/>
+            <a:blip r:embed="rId7" cstate="print"/>
             <a:stretch>
               <a:fillRect/>
             </a:stretch>
@@ -8019,7 +9709,7 @@
             <p:nvPr/>
           </p:nvPicPr>
           <p:blipFill>
-            <a:blip r:embed="rId7" cstate="print"/>
+            <a:blip r:embed="rId8" cstate="print"/>
             <a:stretch>
               <a:fillRect/>
             </a:stretch>
@@ -8058,7 +9748,7 @@
             <p:nvPr/>
           </p:nvPicPr>
           <p:blipFill>
-            <a:blip r:embed="rId8" cstate="print"/>
+            <a:blip r:embed="rId9" cstate="print"/>
             <a:stretch>
               <a:fillRect/>
             </a:stretch>
@@ -8097,7 +9787,7 @@
             <p:nvPr/>
           </p:nvPicPr>
           <p:blipFill>
-            <a:blip r:embed="rId9" cstate="print"/>
+            <a:blip r:embed="rId10" cstate="print"/>
             <a:stretch>
               <a:fillRect/>
             </a:stretch>
@@ -8136,7 +9826,7 @@
             <p:nvPr/>
           </p:nvPicPr>
           <p:blipFill>
-            <a:blip r:embed="rId9" cstate="print"/>
+            <a:blip r:embed="rId10" cstate="print"/>
             <a:stretch>
               <a:fillRect/>
             </a:stretch>
@@ -8175,7 +9865,7 @@
             <p:nvPr/>
           </p:nvPicPr>
           <p:blipFill>
-            <a:blip r:embed="rId10" cstate="print"/>
+            <a:blip r:embed="rId11" cstate="print"/>
             <a:stretch>
               <a:fillRect/>
             </a:stretch>
@@ -8214,7 +9904,7 @@
             <p:nvPr/>
           </p:nvPicPr>
           <p:blipFill>
-            <a:blip r:embed="rId11" cstate="print"/>
+            <a:blip r:embed="rId12" cstate="print"/>
             <a:stretch>
               <a:fillRect/>
             </a:stretch>
@@ -8253,7 +9943,7 @@
             <p:nvPr/>
           </p:nvPicPr>
           <p:blipFill>
-            <a:blip r:embed="rId12" cstate="print"/>
+            <a:blip r:embed="rId13" cstate="print"/>
             <a:stretch>
               <a:fillRect/>
             </a:stretch>
@@ -8292,7 +9982,7 @@
             <p:nvPr/>
           </p:nvPicPr>
           <p:blipFill>
-            <a:blip r:embed="rId13" cstate="print"/>
+            <a:blip r:embed="rId14" cstate="print"/>
             <a:stretch>
               <a:fillRect/>
             </a:stretch>
@@ -8331,7 +10021,7 @@
             <p:nvPr/>
           </p:nvPicPr>
           <p:blipFill>
-            <a:blip r:embed="rId14" cstate="print"/>
+            <a:blip r:embed="rId15" cstate="print"/>
             <a:stretch>
               <a:fillRect/>
             </a:stretch>
@@ -8718,9 +10408,190 @@
                 <a:latin typeface="Bebas Neue" pitchFamily="34" charset="0"/>
                 <a:cs typeface="Bebas Neue" pitchFamily="34" charset="0"/>
               </a:rPr>
-              <a:t>05</a:t>
+              <a:t>04</a:t>
             </a:r>
             <a:endParaRPr lang="en-US" dirty="0"/>
+          </a:p>
+        </p:txBody>
+      </p:sp>
+    </p:spTree>
+  </p:cSld>
+  <p:clrMapOvr>
+    <a:masterClrMapping/>
+  </p:clrMapOvr>
+</p:sld>
+</file>
+
+<file path=ppt/slides/slide9.xml><?xml version="1.0" encoding="utf-8"?>
+<p:sld xmlns:a="http://schemas.openxmlformats.org/drawingml/2006/main" xmlns:r="http://schemas.openxmlformats.org/officeDocument/2006/relationships" xmlns:p="http://schemas.openxmlformats.org/presentationml/2006/main">
+  <p:cSld name="Slide 6">
+    <p:bg>
+      <p:bgPr>
+        <a:solidFill>
+          <a:srgbClr val="BFBFBF"/>
+        </a:solidFill>
+        <a:effectLst/>
+      </p:bgPr>
+    </p:bg>
+    <p:spTree>
+      <p:nvGrpSpPr>
+        <p:cNvPr id="1" name=""/>
+        <p:cNvGrpSpPr/>
+        <p:nvPr/>
+      </p:nvGrpSpPr>
+      <p:grpSpPr>
+        <a:xfrm>
+          <a:off x="0" y="0"/>
+          <a:ext cx="0" cy="0"/>
+          <a:chOff x="0" y="0"/>
+          <a:chExt cx="0" cy="0"/>
+        </a:xfrm>
+      </p:grpSpPr>
+      <p:sp>
+        <p:nvSpPr>
+          <p:cNvPr id="3" name="Object 3"/>
+          <p:cNvSpPr txBox="1"/>
+          <p:nvPr/>
+        </p:nvSpPr>
+        <p:spPr>
+          <a:xfrm>
+            <a:off x="1114286" y="776257"/>
+            <a:ext cx="10214286" cy="1154162"/>
+          </a:xfrm>
+          <a:prstGeom prst="rect">
+            <a:avLst/>
+          </a:prstGeom>
+          <a:noFill/>
+        </p:spPr>
+        <p:txBody>
+          <a:bodyPr wrap="square" rtlCol="0" anchor="t">
+            <a:spAutoFit/>
+          </a:bodyPr>
+          <a:lstStyle/>
+          <a:p>
+            <a:r>
+              <a:rPr lang="ko-KR" altLang="en-US" sz="6900" kern="0" spc="-300" dirty="0">
+                <a:solidFill>
+                  <a:srgbClr val="40514E"/>
+                </a:solidFill>
+                <a:latin typeface="THELuxGoB" pitchFamily="34" charset="0"/>
+                <a:cs typeface="THELuxGoB" pitchFamily="34" charset="0"/>
+              </a:rPr>
+              <a:t>감사합니다</a:t>
+            </a:r>
+            <a:r>
+              <a:rPr lang="en-US" altLang="ko-KR" sz="6900" kern="0" spc="-300" dirty="0">
+                <a:solidFill>
+                  <a:srgbClr val="40514E"/>
+                </a:solidFill>
+                <a:latin typeface="THELuxGoB" pitchFamily="34" charset="0"/>
+                <a:cs typeface="THELuxGoB" pitchFamily="34" charset="0"/>
+              </a:rPr>
+              <a:t>.</a:t>
+            </a:r>
+            <a:endParaRPr lang="en-US" dirty="0"/>
+          </a:p>
+        </p:txBody>
+      </p:sp>
+      <p:sp>
+        <p:nvSpPr>
+          <p:cNvPr id="5" name="TextBox 4">
+            <a:extLst>
+              <a:ext uri="{FF2B5EF4-FFF2-40B4-BE49-F238E27FC236}">
+                <a16:creationId xmlns:a16="http://schemas.microsoft.com/office/drawing/2014/main" id="{F57E3F61-EE0D-2F16-670E-39757E7DFEF1}"/>
+              </a:ext>
+            </a:extLst>
+          </p:cNvPr>
+          <p:cNvSpPr txBox="1"/>
+          <p:nvPr/>
+        </p:nvSpPr>
+        <p:spPr>
+          <a:xfrm>
+            <a:off x="1114286" y="2476500"/>
+            <a:ext cx="9248914" cy="3693319"/>
+          </a:xfrm>
+          <a:prstGeom prst="rect">
+            <a:avLst/>
+          </a:prstGeom>
+          <a:noFill/>
+        </p:spPr>
+        <p:txBody>
+          <a:bodyPr wrap="square" rtlCol="0">
+            <a:spAutoFit/>
+          </a:bodyPr>
+          <a:lstStyle/>
+          <a:p>
+            <a:r>
+              <a:rPr lang="ko-KR" altLang="en-US" dirty="0"/>
+              <a:t>참고자료</a:t>
+            </a:r>
+            <a:endParaRPr lang="en-US" altLang="ko-KR" dirty="0"/>
+          </a:p>
+          <a:p>
+            <a:endParaRPr lang="en-US" altLang="ko-KR" dirty="0"/>
+          </a:p>
+          <a:p>
+            <a:r>
+              <a:rPr lang="ko-KR" altLang="en-US" dirty="0"/>
+              <a:t>제로 탄산 음료 시장 분석</a:t>
+            </a:r>
+            <a:endParaRPr lang="en-US" altLang="ko-KR" dirty="0"/>
+          </a:p>
+          <a:p>
+            <a:r>
+              <a:rPr lang="en-US" altLang="ko-KR" dirty="0"/>
+              <a:t>https://www.wiseapp.co.kr/insight/detail/217</a:t>
+            </a:r>
+          </a:p>
+          <a:p>
+            <a:endParaRPr lang="en-US" altLang="ko-KR" dirty="0"/>
+          </a:p>
+          <a:p>
+            <a:r>
+              <a:rPr lang="ko-KR" altLang="en-US" dirty="0"/>
+              <a:t>텍스트 네트워크 학술자료</a:t>
+            </a:r>
+            <a:endParaRPr lang="en-US" altLang="ko-KR" dirty="0"/>
+          </a:p>
+          <a:p>
+            <a:r>
+              <a:rPr lang="ko-KR" altLang="en-US" dirty="0"/>
+              <a:t>언어 텍스트 네트워크 분석 워크샵 </a:t>
+            </a:r>
+            <a:r>
+              <a:rPr lang="en-US" altLang="ko-KR" dirty="0"/>
+              <a:t>/ </a:t>
+            </a:r>
+            <a:r>
+              <a:rPr lang="ko-KR" altLang="en-US" dirty="0"/>
+              <a:t>서울대학교 사범대학 교육심리 전공 박사과정 </a:t>
+            </a:r>
+            <a:r>
+              <a:rPr lang="en-US" altLang="ko-KR" dirty="0"/>
+              <a:t>/ </a:t>
+            </a:r>
+            <a:r>
+              <a:rPr lang="ko-KR" altLang="en-US" dirty="0" err="1"/>
+              <a:t>류장한</a:t>
+            </a:r>
+            <a:endParaRPr lang="en-US" altLang="ko-KR" dirty="0"/>
+          </a:p>
+          <a:p>
+            <a:endParaRPr lang="en-US" altLang="ko-KR" dirty="0"/>
+          </a:p>
+          <a:p>
+            <a:r>
+              <a:rPr lang="ko-KR" altLang="en-US" dirty="0"/>
+              <a:t>홈페이지 예시</a:t>
+            </a:r>
+            <a:endParaRPr lang="en-US" altLang="ko-KR" dirty="0"/>
+          </a:p>
+          <a:p>
+            <a:r>
+              <a:rPr lang="en-US" altLang="ko-KR" dirty="0"/>
+              <a:t>https://ko.wix.com/website-template/view/html/3078?originUrl=https%3A%2F%2Fko.wix.com%2Fwebsite%2Ftemplates%2Fhtml%2Frestaurants-food%2Ffood-drinks%2F2&amp;tpClick=view_button&amp;esi=e2392428-b879-4790-839b-fd15ccb21026</a:t>
+            </a:r>
+            <a:endParaRPr lang="ko-KR" altLang="en-US" dirty="0"/>
           </a:p>
         </p:txBody>
       </p:sp>
@@ -9013,4 +10884,299 @@
   <a:objectDefaults/>
   <a:extraClrSchemeLst/>
 </a:theme>
+</file>
+
+<file path=ppt/theme/theme2.xml><?xml version="1.0" encoding="utf-8"?>
+<a:theme xmlns:a="http://schemas.openxmlformats.org/drawingml/2006/main" name="Office 테마">
+  <a:themeElements>
+    <a:clrScheme name="Office">
+      <a:dk1>
+        <a:sysClr val="windowText" lastClr="000000"/>
+      </a:dk1>
+      <a:lt1>
+        <a:sysClr val="window" lastClr="FFFFFF"/>
+      </a:lt1>
+      <a:dk2>
+        <a:srgbClr val="44546A"/>
+      </a:dk2>
+      <a:lt2>
+        <a:srgbClr val="E7E6E6"/>
+      </a:lt2>
+      <a:accent1>
+        <a:srgbClr val="4472C4"/>
+      </a:accent1>
+      <a:accent2>
+        <a:srgbClr val="ED7D31"/>
+      </a:accent2>
+      <a:accent3>
+        <a:srgbClr val="A5A5A5"/>
+      </a:accent3>
+      <a:accent4>
+        <a:srgbClr val="FFC000"/>
+      </a:accent4>
+      <a:accent5>
+        <a:srgbClr val="5B9BD5"/>
+      </a:accent5>
+      <a:accent6>
+        <a:srgbClr val="70AD47"/>
+      </a:accent6>
+      <a:hlink>
+        <a:srgbClr val="0563C1"/>
+      </a:hlink>
+      <a:folHlink>
+        <a:srgbClr val="954F72"/>
+      </a:folHlink>
+    </a:clrScheme>
+    <a:fontScheme name="Office">
+      <a:majorFont>
+        <a:latin typeface="맑은 고딕" panose="020F0302020204030204"/>
+        <a:ea typeface=""/>
+        <a:cs typeface=""/>
+        <a:font script="Jpan" typeface="游ゴシック Light"/>
+        <a:font script="Hang" typeface="맑은 고딕"/>
+        <a:font script="Hans" typeface="等线 Light"/>
+        <a:font script="Hant" typeface="新細明體"/>
+        <a:font script="Arab" typeface="Times New Roman"/>
+        <a:font script="Hebr" typeface="Times New Roman"/>
+        <a:font script="Thai" typeface="Angsana New"/>
+        <a:font script="Ethi" typeface="Nyala"/>
+        <a:font script="Beng" typeface="Vrinda"/>
+        <a:font script="Gujr" typeface="Shruti"/>
+        <a:font script="Khmr" typeface="MoolBoran"/>
+        <a:font script="Knda" typeface="Tunga"/>
+        <a:font script="Guru" typeface="Raavi"/>
+        <a:font script="Cans" typeface="Euphemia"/>
+        <a:font script="Cher" typeface="Plantagenet Cherokee"/>
+        <a:font script="Yiii" typeface="Microsoft Yi Baiti"/>
+        <a:font script="Tibt" typeface="Microsoft Himalaya"/>
+        <a:font script="Thaa" typeface="MV Boli"/>
+        <a:font script="Deva" typeface="Mangal"/>
+        <a:font script="Telu" typeface="Gautami"/>
+        <a:font script="Taml" typeface="Latha"/>
+        <a:font script="Syrc" typeface="Estrangelo Edessa"/>
+        <a:font script="Orya" typeface="Kalinga"/>
+        <a:font script="Mlym" typeface="Kartika"/>
+        <a:font script="Laoo" typeface="DokChampa"/>
+        <a:font script="Sinh" typeface="Iskoola Pota"/>
+        <a:font script="Mong" typeface="Mongolian Baiti"/>
+        <a:font script="Viet" typeface="Times New Roman"/>
+        <a:font script="Uigh" typeface="Microsoft Uighur"/>
+        <a:font script="Geor" typeface="Sylfaen"/>
+        <a:font script="Armn" typeface="Arial"/>
+        <a:font script="Bugi" typeface="Leelawadee UI"/>
+        <a:font script="Bopo" typeface="Microsoft JhengHei"/>
+        <a:font script="Java" typeface="Javanese Text"/>
+        <a:font script="Lisu" typeface="Segoe UI"/>
+        <a:font script="Mymr" typeface="Myanmar Text"/>
+        <a:font script="Nkoo" typeface="Ebrima"/>
+        <a:font script="Olck" typeface="Nirmala UI"/>
+        <a:font script="Osma" typeface="Ebrima"/>
+        <a:font script="Phag" typeface="Phagspa"/>
+        <a:font script="Syrn" typeface="Estrangelo Edessa"/>
+        <a:font script="Syrj" typeface="Estrangelo Edessa"/>
+        <a:font script="Syre" typeface="Estrangelo Edessa"/>
+        <a:font script="Sora" typeface="Nirmala UI"/>
+        <a:font script="Tale" typeface="Microsoft Tai Le"/>
+        <a:font script="Talu" typeface="Microsoft New Tai Lue"/>
+        <a:font script="Tfng" typeface="Ebrima"/>
+      </a:majorFont>
+      <a:minorFont>
+        <a:latin typeface="맑은 고딕" panose="020F0502020204030204"/>
+        <a:ea typeface=""/>
+        <a:cs typeface=""/>
+        <a:font script="Jpan" typeface="游ゴシック"/>
+        <a:font script="Hang" typeface="맑은 고딕"/>
+        <a:font script="Hans" typeface="等线"/>
+        <a:font script="Hant" typeface="新細明體"/>
+        <a:font script="Arab" typeface="Arial"/>
+        <a:font script="Hebr" typeface="Arial"/>
+        <a:font script="Thai" typeface="Cordia New"/>
+        <a:font script="Ethi" typeface="Nyala"/>
+        <a:font script="Beng" typeface="Vrinda"/>
+        <a:font script="Gujr" typeface="Shruti"/>
+        <a:font script="Khmr" typeface="DaunPenh"/>
+        <a:font script="Knda" typeface="Tunga"/>
+        <a:font script="Guru" typeface="Raavi"/>
+        <a:font script="Cans" typeface="Euphemia"/>
+        <a:font script="Cher" typeface="Plantagenet Cherokee"/>
+        <a:font script="Yiii" typeface="Microsoft Yi Baiti"/>
+        <a:font script="Tibt" typeface="Microsoft Himalaya"/>
+        <a:font script="Thaa" typeface="MV Boli"/>
+        <a:font script="Deva" typeface="Mangal"/>
+        <a:font script="Telu" typeface="Gautami"/>
+        <a:font script="Taml" typeface="Latha"/>
+        <a:font script="Syrc" typeface="Estrangelo Edessa"/>
+        <a:font script="Orya" typeface="Kalinga"/>
+        <a:font script="Mlym" typeface="Kartika"/>
+        <a:font script="Laoo" typeface="DokChampa"/>
+        <a:font script="Sinh" typeface="Iskoola Pota"/>
+        <a:font script="Mong" typeface="Mongolian Baiti"/>
+        <a:font script="Viet" typeface="Arial"/>
+        <a:font script="Uigh" typeface="Microsoft Uighur"/>
+        <a:font script="Geor" typeface="Sylfaen"/>
+        <a:font script="Armn" typeface="Arial"/>
+        <a:font script="Bugi" typeface="Leelawadee UI"/>
+        <a:font script="Bopo" typeface="Microsoft JhengHei"/>
+        <a:font script="Java" typeface="Javanese Text"/>
+        <a:font script="Lisu" typeface="Segoe UI"/>
+        <a:font script="Mymr" typeface="Myanmar Text"/>
+        <a:font script="Nkoo" typeface="Ebrima"/>
+        <a:font script="Olck" typeface="Nirmala UI"/>
+        <a:font script="Osma" typeface="Ebrima"/>
+        <a:font script="Phag" typeface="Phagspa"/>
+        <a:font script="Syrn" typeface="Estrangelo Edessa"/>
+        <a:font script="Syrj" typeface="Estrangelo Edessa"/>
+        <a:font script="Syre" typeface="Estrangelo Edessa"/>
+        <a:font script="Sora" typeface="Nirmala UI"/>
+        <a:font script="Tale" typeface="Microsoft Tai Le"/>
+        <a:font script="Talu" typeface="Microsoft New Tai Lue"/>
+        <a:font script="Tfng" typeface="Ebrima"/>
+      </a:minorFont>
+    </a:fontScheme>
+    <a:fmtScheme name="Office">
+      <a:fillStyleLst>
+        <a:solidFill>
+          <a:schemeClr val="phClr"/>
+        </a:solidFill>
+        <a:gradFill rotWithShape="1">
+          <a:gsLst>
+            <a:gs pos="0">
+              <a:schemeClr val="phClr">
+                <a:lumMod val="110000"/>
+                <a:satMod val="105000"/>
+                <a:tint val="67000"/>
+              </a:schemeClr>
+            </a:gs>
+            <a:gs pos="50000">
+              <a:schemeClr val="phClr">
+                <a:lumMod val="105000"/>
+                <a:satMod val="103000"/>
+                <a:tint val="73000"/>
+              </a:schemeClr>
+            </a:gs>
+            <a:gs pos="100000">
+              <a:schemeClr val="phClr">
+                <a:lumMod val="105000"/>
+                <a:satMod val="109000"/>
+                <a:tint val="81000"/>
+              </a:schemeClr>
+            </a:gs>
+          </a:gsLst>
+          <a:lin ang="5400000" scaled="0"/>
+        </a:gradFill>
+        <a:gradFill rotWithShape="1">
+          <a:gsLst>
+            <a:gs pos="0">
+              <a:schemeClr val="phClr">
+                <a:satMod val="103000"/>
+                <a:lumMod val="102000"/>
+                <a:tint val="94000"/>
+              </a:schemeClr>
+            </a:gs>
+            <a:gs pos="50000">
+              <a:schemeClr val="phClr">
+                <a:satMod val="110000"/>
+                <a:lumMod val="100000"/>
+                <a:shade val="100000"/>
+              </a:schemeClr>
+            </a:gs>
+            <a:gs pos="100000">
+              <a:schemeClr val="phClr">
+                <a:lumMod val="99000"/>
+                <a:satMod val="120000"/>
+                <a:shade val="78000"/>
+              </a:schemeClr>
+            </a:gs>
+          </a:gsLst>
+          <a:lin ang="5400000" scaled="0"/>
+        </a:gradFill>
+      </a:fillStyleLst>
+      <a:lnStyleLst>
+        <a:ln w="6350" cap="flat" cmpd="sng" algn="ctr">
+          <a:solidFill>
+            <a:schemeClr val="phClr"/>
+          </a:solidFill>
+          <a:prstDash val="solid"/>
+          <a:miter lim="800000"/>
+        </a:ln>
+        <a:ln w="12700" cap="flat" cmpd="sng" algn="ctr">
+          <a:solidFill>
+            <a:schemeClr val="phClr"/>
+          </a:solidFill>
+          <a:prstDash val="solid"/>
+          <a:miter lim="800000"/>
+        </a:ln>
+        <a:ln w="19050" cap="flat" cmpd="sng" algn="ctr">
+          <a:solidFill>
+            <a:schemeClr val="phClr"/>
+          </a:solidFill>
+          <a:prstDash val="solid"/>
+          <a:miter lim="800000"/>
+        </a:ln>
+      </a:lnStyleLst>
+      <a:effectStyleLst>
+        <a:effectStyle>
+          <a:effectLst/>
+        </a:effectStyle>
+        <a:effectStyle>
+          <a:effectLst/>
+        </a:effectStyle>
+        <a:effectStyle>
+          <a:effectLst>
+            <a:outerShdw blurRad="57150" dist="19050" dir="5400000" algn="ctr" rotWithShape="0">
+              <a:srgbClr val="000000">
+                <a:alpha val="63000"/>
+              </a:srgbClr>
+            </a:outerShdw>
+          </a:effectLst>
+        </a:effectStyle>
+      </a:effectStyleLst>
+      <a:bgFillStyleLst>
+        <a:solidFill>
+          <a:schemeClr val="phClr"/>
+        </a:solidFill>
+        <a:solidFill>
+          <a:schemeClr val="phClr">
+            <a:tint val="95000"/>
+            <a:satMod val="170000"/>
+          </a:schemeClr>
+        </a:solidFill>
+        <a:gradFill rotWithShape="1">
+          <a:gsLst>
+            <a:gs pos="0">
+              <a:schemeClr val="phClr">
+                <a:tint val="93000"/>
+                <a:satMod val="150000"/>
+                <a:shade val="98000"/>
+                <a:lumMod val="102000"/>
+              </a:schemeClr>
+            </a:gs>
+            <a:gs pos="50000">
+              <a:schemeClr val="phClr">
+                <a:tint val="98000"/>
+                <a:satMod val="130000"/>
+                <a:shade val="90000"/>
+                <a:lumMod val="103000"/>
+              </a:schemeClr>
+            </a:gs>
+            <a:gs pos="100000">
+              <a:schemeClr val="phClr">
+                <a:shade val="63000"/>
+                <a:satMod val="120000"/>
+              </a:schemeClr>
+            </a:gs>
+          </a:gsLst>
+          <a:lin ang="5400000" scaled="0"/>
+        </a:gradFill>
+      </a:bgFillStyleLst>
+    </a:fmtScheme>
+  </a:themeElements>
+  <a:objectDefaults/>
+  <a:extraClrSchemeLst/>
+  <a:extLst>
+    <a:ext uri="{05A4C25C-085E-4340-85A3-A5531E510DB2}">
+      <thm15:themeFamily xmlns:thm15="http://schemas.microsoft.com/office/thememl/2012/main" name="Office Theme" id="{62F939B6-93AF-4DB8-9C6B-D6C7DFDC589F}" vid="{4A3C46E8-61CC-4603-A589-7422A47A8E4A}"/>
+    </a:ext>
+  </a:extLst>
+</a:theme>
 </file>
</xml_diff>